<commit_message>
Finalize BGA presentation 2
</commit_message>
<xml_diff>
--- a/BGA 2022 presentation.pptx
+++ b/BGA 2022 presentation.pptx
@@ -6125,61 +6125,6 @@
           <a:chExt cx="0" cy="0"/>
         </a:xfrm>
       </p:grpSpPr>
-      <p:pic>
-        <p:nvPicPr>
-          <p:cNvPr id="4" name="Picture 3">
-            <a:extLst>
-              <a:ext uri="{FF2B5EF4-FFF2-40B4-BE49-F238E27FC236}">
-                <a16:creationId xmlns:a16="http://schemas.microsoft.com/office/drawing/2014/main" id="{0380467D-EE33-F74B-8CF8-488AD6B94B10}"/>
-              </a:ext>
-            </a:extLst>
-          </p:cNvPr>
-          <p:cNvPicPr>
-            <a:picLocks noChangeAspect="1"/>
-          </p:cNvPicPr>
-          <p:nvPr/>
-        </p:nvPicPr>
-        <p:blipFill>
-          <a:blip r:embed="rId2"/>
-          <a:stretch>
-            <a:fillRect/>
-          </a:stretch>
-        </p:blipFill>
-        <p:spPr>
-          <a:xfrm>
-            <a:off x="2076450" y="1778000"/>
-            <a:ext cx="8039100" cy="3302000"/>
-          </a:xfrm>
-          <a:prstGeom prst="roundRect">
-            <a:avLst>
-              <a:gd name="adj" fmla="val 1921"/>
-            </a:avLst>
-          </a:prstGeom>
-          <a:solidFill>
-            <a:srgbClr val="FFFFFF">
-              <a:shade val="85000"/>
-            </a:srgbClr>
-          </a:solidFill>
-          <a:ln>
-            <a:noFill/>
-          </a:ln>
-          <a:effectLst/>
-        </p:spPr>
-        <p:style>
-          <a:lnRef idx="2">
-            <a:schemeClr val="dk1"/>
-          </a:lnRef>
-          <a:fillRef idx="1">
-            <a:schemeClr val="lt1"/>
-          </a:fillRef>
-          <a:effectRef idx="0">
-            <a:schemeClr val="dk1"/>
-          </a:effectRef>
-          <a:fontRef idx="minor">
-            <a:schemeClr val="dk1"/>
-          </a:fontRef>
-        </p:style>
-      </p:pic>
       <p:sp>
         <p:nvSpPr>
           <p:cNvPr id="6" name="TextBox 5">
@@ -6210,7 +6155,7 @@
           <a:p>
             <a:r>
               <a:rPr lang="en-US" sz="2400">
-                <a:hlinkClick r:id="rId3" action="ppaction://hlinksldjump"/>
+                <a:hlinkClick r:id="rId2" action="ppaction://hlinksldjump"/>
               </a:rPr>
               <a:t>Robustness</a:t>
             </a:r>
@@ -6220,7 +6165,7 @@
       </p:sp>
       <mc:AlternateContent xmlns:mc="http://schemas.openxmlformats.org/markup-compatibility/2006" xmlns:p14="http://schemas.microsoft.com/office/powerpoint/2010/main">
         <mc:Choice Requires="p14">
-          <p:contentPart p14:bwMode="auto" r:id="rId4">
+          <p:contentPart p14:bwMode="auto" r:id="rId3">
             <p14:nvContentPartPr>
               <p14:cNvPr id="7" name="Ink 6">
                 <a:extLst>
@@ -6614,6 +6559,47 @@
           </a:p>
         </p:txBody>
       </p:sp>
+      <p:pic>
+        <p:nvPicPr>
+          <p:cNvPr id="2" name="Picture 1">
+            <a:extLst>
+              <a:ext uri="{FF2B5EF4-FFF2-40B4-BE49-F238E27FC236}">
+                <a16:creationId xmlns:a16="http://schemas.microsoft.com/office/drawing/2014/main" id="{6DF50029-6607-4BC6-63D6-8D57AB59DBC6}"/>
+              </a:ext>
+            </a:extLst>
+          </p:cNvPr>
+          <p:cNvPicPr>
+            <a:picLocks noChangeAspect="1"/>
+          </p:cNvPicPr>
+          <p:nvPr/>
+        </p:nvPicPr>
+        <p:blipFill>
+          <a:blip r:embed="rId15"/>
+          <a:stretch>
+            <a:fillRect/>
+          </a:stretch>
+        </p:blipFill>
+        <p:spPr>
+          <a:xfrm>
+            <a:off x="2076450" y="1478433"/>
+            <a:ext cx="8445500" cy="3187700"/>
+          </a:xfrm>
+          <a:prstGeom prst="roundRect">
+            <a:avLst>
+              <a:gd name="adj" fmla="val 1921"/>
+            </a:avLst>
+          </a:prstGeom>
+          <a:solidFill>
+            <a:srgbClr val="FFFFFF">
+              <a:shade val="85000"/>
+            </a:srgbClr>
+          </a:solidFill>
+          <a:ln>
+            <a:noFill/>
+          </a:ln>
+          <a:effectLst/>
+        </p:spPr>
+      </p:pic>
     </p:spTree>
     <p:extLst>
       <p:ext uri="{BB962C8B-B14F-4D97-AF65-F5344CB8AC3E}">
@@ -6746,7 +6732,7 @@
             </a:r>
             <a:r>
               <a:rPr lang="en-US"/>
-              <a:t>. Genetics can be a mediator, not just a confound, for SES.</a:t>
+              <a:t>. Genetics can be a mediator, not just a confound, for transmission of SES over generations.</a:t>
             </a:r>
           </a:p>
           <a:p>
@@ -6782,7 +6768,7 @@
             </a:pPr>
             <a:r>
               <a:rPr lang="en-US"/>
-              <a:t>In meritocratic societies, genes affect SES. </a:t>
+              <a:t>In modern meritocratic societies, genes affect SES. </a:t>
             </a:r>
           </a:p>
           <a:p>
@@ -6907,7 +6893,7 @@
             </a:pPr>
             <a:r>
               <a:rPr lang="en-US"/>
-              <a:t>Size of g</a:t>
+              <a:t>The size of the g</a:t>
             </a:r>
             <a:r>
               <a:rPr lang="en-GB"/>
@@ -6915,7 +6901,7 @@
             </a:r>
             <a:r>
               <a:rPr lang="en-US"/>
-              <a:t> correlation is affected by economic institutions</a:t>
+              <a:t> gradient is affected by socio-economic institutions</a:t>
             </a:r>
             <a:r>
               <a:rPr lang="el-GR"/>

</xml_diff>

<commit_message>
Very last tweaks to BGA presentation
</commit_message>
<xml_diff>
--- a/BGA 2022 presentation.pptx
+++ b/BGA 2022 presentation.pptx
@@ -129,6 +129,2417 @@
     </p:ext>
   </p:extLst>
 </p:presentation>
+</file>
+
+<file path=ppt/diagrams/colors1.xml><?xml version="1.0" encoding="utf-8"?>
+<dgm:colorsDef xmlns:dgm="http://schemas.openxmlformats.org/drawingml/2006/diagram" xmlns:a="http://schemas.openxmlformats.org/drawingml/2006/main" uniqueId="urn:microsoft.com/office/officeart/2005/8/colors/colorful4">
+  <dgm:title val=""/>
+  <dgm:desc val=""/>
+  <dgm:catLst>
+    <dgm:cat type="colorful" pri="10400"/>
+  </dgm:catLst>
+  <dgm:styleLbl name="node0">
+    <dgm:fillClrLst meth="repeat">
+      <a:schemeClr val="accent3"/>
+    </dgm:fillClrLst>
+    <dgm:linClrLst meth="repeat">
+      <a:schemeClr val="lt1"/>
+    </dgm:linClrLst>
+    <dgm:effectClrLst/>
+    <dgm:txLinClrLst/>
+    <dgm:txFillClrLst/>
+    <dgm:txEffectClrLst/>
+  </dgm:styleLbl>
+  <dgm:styleLbl name="node1">
+    <dgm:fillClrLst>
+      <a:schemeClr val="accent4"/>
+      <a:schemeClr val="accent5"/>
+    </dgm:fillClrLst>
+    <dgm:linClrLst meth="repeat">
+      <a:schemeClr val="lt1"/>
+    </dgm:linClrLst>
+    <dgm:effectClrLst/>
+    <dgm:txLinClrLst/>
+    <dgm:txFillClrLst/>
+    <dgm:txEffectClrLst/>
+  </dgm:styleLbl>
+  <dgm:styleLbl name="alignNode1">
+    <dgm:fillClrLst>
+      <a:schemeClr val="accent4"/>
+      <a:schemeClr val="accent5"/>
+    </dgm:fillClrLst>
+    <dgm:linClrLst>
+      <a:schemeClr val="accent4"/>
+      <a:schemeClr val="accent5"/>
+    </dgm:linClrLst>
+    <dgm:effectClrLst/>
+    <dgm:txLinClrLst/>
+    <dgm:txFillClrLst/>
+    <dgm:txEffectClrLst/>
+  </dgm:styleLbl>
+  <dgm:styleLbl name="lnNode1">
+    <dgm:fillClrLst>
+      <a:schemeClr val="accent4"/>
+      <a:schemeClr val="accent5"/>
+    </dgm:fillClrLst>
+    <dgm:linClrLst meth="repeat">
+      <a:schemeClr val="lt1"/>
+    </dgm:linClrLst>
+    <dgm:effectClrLst/>
+    <dgm:txLinClrLst/>
+    <dgm:txFillClrLst/>
+    <dgm:txEffectClrLst/>
+  </dgm:styleLbl>
+  <dgm:styleLbl name="vennNode1">
+    <dgm:fillClrLst>
+      <a:schemeClr val="accent4">
+        <a:alpha val="50000"/>
+      </a:schemeClr>
+      <a:schemeClr val="accent5">
+        <a:alpha val="50000"/>
+      </a:schemeClr>
+    </dgm:fillClrLst>
+    <dgm:linClrLst meth="repeat">
+      <a:schemeClr val="lt1"/>
+    </dgm:linClrLst>
+    <dgm:effectClrLst/>
+    <dgm:txLinClrLst/>
+    <dgm:txFillClrLst/>
+    <dgm:txEffectClrLst/>
+  </dgm:styleLbl>
+  <dgm:styleLbl name="node2">
+    <dgm:fillClrLst>
+      <a:schemeClr val="accent5"/>
+    </dgm:fillClrLst>
+    <dgm:linClrLst meth="repeat">
+      <a:schemeClr val="lt1"/>
+    </dgm:linClrLst>
+    <dgm:effectClrLst/>
+    <dgm:txLinClrLst/>
+    <dgm:txFillClrLst/>
+    <dgm:txEffectClrLst/>
+  </dgm:styleLbl>
+  <dgm:styleLbl name="node3">
+    <dgm:fillClrLst>
+      <a:schemeClr val="accent6"/>
+    </dgm:fillClrLst>
+    <dgm:linClrLst meth="repeat">
+      <a:schemeClr val="lt1"/>
+    </dgm:linClrLst>
+    <dgm:effectClrLst/>
+    <dgm:txLinClrLst/>
+    <dgm:txFillClrLst/>
+    <dgm:txEffectClrLst/>
+  </dgm:styleLbl>
+  <dgm:styleLbl name="node4">
+    <dgm:fillClrLst>
+      <a:schemeClr val="accent1"/>
+    </dgm:fillClrLst>
+    <dgm:linClrLst meth="repeat">
+      <a:schemeClr val="lt1"/>
+    </dgm:linClrLst>
+    <dgm:effectClrLst/>
+    <dgm:txLinClrLst/>
+    <dgm:txFillClrLst/>
+    <dgm:txEffectClrLst/>
+  </dgm:styleLbl>
+  <dgm:styleLbl name="fgImgPlace1">
+    <dgm:fillClrLst>
+      <a:schemeClr val="accent4">
+        <a:tint val="50000"/>
+      </a:schemeClr>
+      <a:schemeClr val="accent5">
+        <a:tint val="50000"/>
+      </a:schemeClr>
+    </dgm:fillClrLst>
+    <dgm:linClrLst meth="repeat">
+      <a:schemeClr val="lt1"/>
+    </dgm:linClrLst>
+    <dgm:effectClrLst/>
+    <dgm:txLinClrLst/>
+    <dgm:txFillClrLst meth="repeat">
+      <a:schemeClr val="lt1"/>
+    </dgm:txFillClrLst>
+    <dgm:txEffectClrLst/>
+  </dgm:styleLbl>
+  <dgm:styleLbl name="alignImgPlace1">
+    <dgm:fillClrLst>
+      <a:schemeClr val="accent4">
+        <a:tint val="50000"/>
+      </a:schemeClr>
+      <a:schemeClr val="accent5">
+        <a:tint val="20000"/>
+      </a:schemeClr>
+    </dgm:fillClrLst>
+    <dgm:linClrLst meth="repeat">
+      <a:schemeClr val="lt1"/>
+    </dgm:linClrLst>
+    <dgm:effectClrLst/>
+    <dgm:txLinClrLst/>
+    <dgm:txFillClrLst meth="repeat">
+      <a:schemeClr val="lt1"/>
+    </dgm:txFillClrLst>
+    <dgm:txEffectClrLst/>
+  </dgm:styleLbl>
+  <dgm:styleLbl name="bgImgPlace1">
+    <dgm:fillClrLst>
+      <a:schemeClr val="accent4">
+        <a:tint val="50000"/>
+      </a:schemeClr>
+      <a:schemeClr val="accent5">
+        <a:tint val="20000"/>
+      </a:schemeClr>
+    </dgm:fillClrLst>
+    <dgm:linClrLst meth="repeat">
+      <a:schemeClr val="lt1"/>
+    </dgm:linClrLst>
+    <dgm:effectClrLst/>
+    <dgm:txLinClrLst/>
+    <dgm:txFillClrLst meth="repeat">
+      <a:schemeClr val="lt1"/>
+    </dgm:txFillClrLst>
+    <dgm:txEffectClrLst/>
+  </dgm:styleLbl>
+  <dgm:styleLbl name="sibTrans2D1">
+    <dgm:fillClrLst>
+      <a:schemeClr val="accent4"/>
+      <a:schemeClr val="accent5"/>
+    </dgm:fillClrLst>
+    <dgm:linClrLst meth="repeat">
+      <a:schemeClr val="lt1"/>
+    </dgm:linClrLst>
+    <dgm:effectClrLst/>
+    <dgm:txLinClrLst/>
+    <dgm:txFillClrLst/>
+    <dgm:txEffectClrLst/>
+  </dgm:styleLbl>
+  <dgm:styleLbl name="fgSibTrans2D1">
+    <dgm:fillClrLst>
+      <a:schemeClr val="accent4"/>
+      <a:schemeClr val="accent5"/>
+    </dgm:fillClrLst>
+    <dgm:linClrLst meth="repeat">
+      <a:schemeClr val="lt1"/>
+    </dgm:linClrLst>
+    <dgm:effectClrLst/>
+    <dgm:txLinClrLst/>
+    <dgm:txFillClrLst meth="repeat">
+      <a:schemeClr val="lt1"/>
+    </dgm:txFillClrLst>
+    <dgm:txEffectClrLst/>
+  </dgm:styleLbl>
+  <dgm:styleLbl name="bgSibTrans2D1">
+    <dgm:fillClrLst>
+      <a:schemeClr val="accent4"/>
+      <a:schemeClr val="accent5"/>
+    </dgm:fillClrLst>
+    <dgm:linClrLst meth="repeat">
+      <a:schemeClr val="lt1"/>
+    </dgm:linClrLst>
+    <dgm:effectClrLst/>
+    <dgm:txLinClrLst/>
+    <dgm:txFillClrLst meth="repeat">
+      <a:schemeClr val="lt1"/>
+    </dgm:txFillClrLst>
+    <dgm:txEffectClrLst/>
+  </dgm:styleLbl>
+  <dgm:styleLbl name="sibTrans1D1">
+    <dgm:fillClrLst/>
+    <dgm:linClrLst>
+      <a:schemeClr val="accent4"/>
+      <a:schemeClr val="accent5"/>
+    </dgm:linClrLst>
+    <dgm:effectClrLst/>
+    <dgm:txLinClrLst/>
+    <dgm:txFillClrLst meth="repeat">
+      <a:schemeClr val="tx1"/>
+    </dgm:txFillClrLst>
+    <dgm:txEffectClrLst/>
+  </dgm:styleLbl>
+  <dgm:styleLbl name="callout">
+    <dgm:fillClrLst meth="repeat">
+      <a:schemeClr val="accent4"/>
+    </dgm:fillClrLst>
+    <dgm:linClrLst meth="repeat">
+      <a:schemeClr val="accent4">
+        <a:tint val="50000"/>
+      </a:schemeClr>
+    </dgm:linClrLst>
+    <dgm:effectClrLst/>
+    <dgm:txLinClrLst/>
+    <dgm:txFillClrLst meth="repeat">
+      <a:schemeClr val="tx1"/>
+    </dgm:txFillClrLst>
+    <dgm:txEffectClrLst/>
+  </dgm:styleLbl>
+  <dgm:styleLbl name="asst0">
+    <dgm:fillClrLst meth="repeat">
+      <a:schemeClr val="accent4"/>
+    </dgm:fillClrLst>
+    <dgm:linClrLst meth="repeat">
+      <a:schemeClr val="lt1">
+        <a:shade val="80000"/>
+      </a:schemeClr>
+    </dgm:linClrLst>
+    <dgm:effectClrLst/>
+    <dgm:txLinClrLst/>
+    <dgm:txFillClrLst/>
+    <dgm:txEffectClrLst/>
+  </dgm:styleLbl>
+  <dgm:styleLbl name="asst1">
+    <dgm:fillClrLst meth="repeat">
+      <a:schemeClr val="accent5"/>
+    </dgm:fillClrLst>
+    <dgm:linClrLst meth="repeat">
+      <a:schemeClr val="lt1">
+        <a:shade val="80000"/>
+      </a:schemeClr>
+    </dgm:linClrLst>
+    <dgm:effectClrLst/>
+    <dgm:txLinClrLst/>
+    <dgm:txFillClrLst/>
+    <dgm:txEffectClrLst/>
+  </dgm:styleLbl>
+  <dgm:styleLbl name="asst2">
+    <dgm:fillClrLst>
+      <a:schemeClr val="accent6"/>
+    </dgm:fillClrLst>
+    <dgm:linClrLst meth="repeat">
+      <a:schemeClr val="lt1"/>
+    </dgm:linClrLst>
+    <dgm:effectClrLst/>
+    <dgm:txLinClrLst/>
+    <dgm:txFillClrLst/>
+    <dgm:txEffectClrLst/>
+  </dgm:styleLbl>
+  <dgm:styleLbl name="asst3">
+    <dgm:fillClrLst>
+      <a:schemeClr val="accent1"/>
+    </dgm:fillClrLst>
+    <dgm:linClrLst meth="repeat">
+      <a:schemeClr val="lt1"/>
+    </dgm:linClrLst>
+    <dgm:effectClrLst/>
+    <dgm:txLinClrLst/>
+    <dgm:txFillClrLst/>
+    <dgm:txEffectClrLst/>
+  </dgm:styleLbl>
+  <dgm:styleLbl name="asst4">
+    <dgm:fillClrLst>
+      <a:schemeClr val="accent2"/>
+    </dgm:fillClrLst>
+    <dgm:linClrLst meth="repeat">
+      <a:schemeClr val="lt1"/>
+    </dgm:linClrLst>
+    <dgm:effectClrLst/>
+    <dgm:txLinClrLst/>
+    <dgm:txFillClrLst/>
+    <dgm:txEffectClrLst/>
+  </dgm:styleLbl>
+  <dgm:styleLbl name="parChTrans2D1">
+    <dgm:fillClrLst meth="repeat">
+      <a:schemeClr val="accent4"/>
+    </dgm:fillClrLst>
+    <dgm:linClrLst meth="repeat">
+      <a:schemeClr val="lt1"/>
+    </dgm:linClrLst>
+    <dgm:effectClrLst/>
+    <dgm:txLinClrLst/>
+    <dgm:txFillClrLst meth="repeat">
+      <a:schemeClr val="lt1"/>
+    </dgm:txFillClrLst>
+    <dgm:txEffectClrLst/>
+  </dgm:styleLbl>
+  <dgm:styleLbl name="parChTrans2D2">
+    <dgm:fillClrLst meth="repeat">
+      <a:schemeClr val="accent5"/>
+    </dgm:fillClrLst>
+    <dgm:linClrLst meth="repeat">
+      <a:schemeClr val="lt1"/>
+    </dgm:linClrLst>
+    <dgm:effectClrLst/>
+    <dgm:txLinClrLst/>
+    <dgm:txFillClrLst/>
+    <dgm:txEffectClrLst/>
+  </dgm:styleLbl>
+  <dgm:styleLbl name="parChTrans2D3">
+    <dgm:fillClrLst meth="repeat">
+      <a:schemeClr val="accent5"/>
+    </dgm:fillClrLst>
+    <dgm:linClrLst meth="repeat">
+      <a:schemeClr val="lt1"/>
+    </dgm:linClrLst>
+    <dgm:effectClrLst/>
+    <dgm:txLinClrLst/>
+    <dgm:txFillClrLst/>
+    <dgm:txEffectClrLst/>
+  </dgm:styleLbl>
+  <dgm:styleLbl name="parChTrans2D4">
+    <dgm:fillClrLst meth="repeat">
+      <a:schemeClr val="accent6"/>
+    </dgm:fillClrLst>
+    <dgm:linClrLst meth="repeat">
+      <a:schemeClr val="lt1"/>
+    </dgm:linClrLst>
+    <dgm:effectClrLst/>
+    <dgm:txLinClrLst/>
+    <dgm:txFillClrLst meth="repeat">
+      <a:schemeClr val="lt1"/>
+    </dgm:txFillClrLst>
+    <dgm:txEffectClrLst/>
+  </dgm:styleLbl>
+  <dgm:styleLbl name="parChTrans1D1">
+    <dgm:fillClrLst meth="repeat">
+      <a:schemeClr val="accent4"/>
+    </dgm:fillClrLst>
+    <dgm:linClrLst meth="repeat">
+      <a:schemeClr val="accent4"/>
+    </dgm:linClrLst>
+    <dgm:effectClrLst/>
+    <dgm:txLinClrLst/>
+    <dgm:txFillClrLst meth="repeat">
+      <a:schemeClr val="tx1"/>
+    </dgm:txFillClrLst>
+    <dgm:txEffectClrLst/>
+  </dgm:styleLbl>
+  <dgm:styleLbl name="parChTrans1D2">
+    <dgm:fillClrLst meth="repeat">
+      <a:schemeClr val="accent4">
+        <a:tint val="90000"/>
+      </a:schemeClr>
+    </dgm:fillClrLst>
+    <dgm:linClrLst meth="repeat">
+      <a:schemeClr val="accent5"/>
+    </dgm:linClrLst>
+    <dgm:effectClrLst/>
+    <dgm:txLinClrLst/>
+    <dgm:txFillClrLst meth="repeat">
+      <a:schemeClr val="tx1"/>
+    </dgm:txFillClrLst>
+    <dgm:txEffectClrLst/>
+  </dgm:styleLbl>
+  <dgm:styleLbl name="parChTrans1D3">
+    <dgm:fillClrLst meth="repeat">
+      <a:schemeClr val="accent4">
+        <a:tint val="70000"/>
+      </a:schemeClr>
+    </dgm:fillClrLst>
+    <dgm:linClrLst meth="repeat">
+      <a:schemeClr val="accent6"/>
+    </dgm:linClrLst>
+    <dgm:effectClrLst/>
+    <dgm:txLinClrLst/>
+    <dgm:txFillClrLst meth="repeat">
+      <a:schemeClr val="tx1"/>
+    </dgm:txFillClrLst>
+    <dgm:txEffectClrLst/>
+  </dgm:styleLbl>
+  <dgm:styleLbl name="parChTrans1D4">
+    <dgm:fillClrLst meth="repeat">
+      <a:schemeClr val="accent4">
+        <a:tint val="50000"/>
+      </a:schemeClr>
+    </dgm:fillClrLst>
+    <dgm:linClrLst meth="repeat">
+      <a:schemeClr val="accent1"/>
+    </dgm:linClrLst>
+    <dgm:effectClrLst/>
+    <dgm:txLinClrLst/>
+    <dgm:txFillClrLst meth="repeat">
+      <a:schemeClr val="tx1"/>
+    </dgm:txFillClrLst>
+    <dgm:txEffectClrLst/>
+  </dgm:styleLbl>
+  <dgm:styleLbl name="fgAcc1">
+    <dgm:fillClrLst meth="repeat">
+      <a:schemeClr val="lt1">
+        <a:alpha val="90000"/>
+      </a:schemeClr>
+    </dgm:fillClrLst>
+    <dgm:linClrLst>
+      <a:schemeClr val="accent4"/>
+      <a:schemeClr val="accent5"/>
+    </dgm:linClrLst>
+    <dgm:effectClrLst/>
+    <dgm:txLinClrLst/>
+    <dgm:txFillClrLst meth="repeat">
+      <a:schemeClr val="dk1"/>
+    </dgm:txFillClrLst>
+    <dgm:txEffectClrLst/>
+  </dgm:styleLbl>
+  <dgm:styleLbl name="conFgAcc1">
+    <dgm:fillClrLst meth="repeat">
+      <a:schemeClr val="lt1">
+        <a:alpha val="90000"/>
+      </a:schemeClr>
+    </dgm:fillClrLst>
+    <dgm:linClrLst>
+      <a:schemeClr val="accent4"/>
+      <a:schemeClr val="accent5"/>
+    </dgm:linClrLst>
+    <dgm:effectClrLst/>
+    <dgm:txLinClrLst/>
+    <dgm:txFillClrLst meth="repeat">
+      <a:schemeClr val="dk1"/>
+    </dgm:txFillClrLst>
+    <dgm:txEffectClrLst/>
+  </dgm:styleLbl>
+  <dgm:styleLbl name="alignAcc1">
+    <dgm:fillClrLst meth="repeat">
+      <a:schemeClr val="lt1">
+        <a:alpha val="90000"/>
+      </a:schemeClr>
+    </dgm:fillClrLst>
+    <dgm:linClrLst>
+      <a:schemeClr val="accent4"/>
+      <a:schemeClr val="accent5"/>
+    </dgm:linClrLst>
+    <dgm:effectClrLst/>
+    <dgm:txLinClrLst/>
+    <dgm:txFillClrLst meth="repeat">
+      <a:schemeClr val="dk1"/>
+    </dgm:txFillClrLst>
+    <dgm:txEffectClrLst/>
+  </dgm:styleLbl>
+  <dgm:styleLbl name="trAlignAcc1">
+    <dgm:fillClrLst meth="repeat">
+      <a:schemeClr val="lt1">
+        <a:alpha val="40000"/>
+      </a:schemeClr>
+    </dgm:fillClrLst>
+    <dgm:linClrLst meth="repeat">
+      <a:schemeClr val="accent4"/>
+    </dgm:linClrLst>
+    <dgm:effectClrLst/>
+    <dgm:txLinClrLst/>
+    <dgm:txFillClrLst meth="repeat">
+      <a:schemeClr val="dk1"/>
+    </dgm:txFillClrLst>
+    <dgm:txEffectClrLst/>
+  </dgm:styleLbl>
+  <dgm:styleLbl name="bgAcc1">
+    <dgm:fillClrLst meth="repeat">
+      <a:schemeClr val="lt1">
+        <a:alpha val="90000"/>
+      </a:schemeClr>
+    </dgm:fillClrLst>
+    <dgm:linClrLst>
+      <a:schemeClr val="accent4"/>
+      <a:schemeClr val="accent5"/>
+    </dgm:linClrLst>
+    <dgm:effectClrLst/>
+    <dgm:txLinClrLst/>
+    <dgm:txFillClrLst meth="repeat">
+      <a:schemeClr val="dk1"/>
+    </dgm:txFillClrLst>
+    <dgm:txEffectClrLst/>
+  </dgm:styleLbl>
+  <dgm:styleLbl name="solidFgAcc1">
+    <dgm:fillClrLst meth="repeat">
+      <a:schemeClr val="lt1"/>
+    </dgm:fillClrLst>
+    <dgm:linClrLst>
+      <a:schemeClr val="accent4"/>
+      <a:schemeClr val="accent5"/>
+    </dgm:linClrLst>
+    <dgm:effectClrLst/>
+    <dgm:txLinClrLst/>
+    <dgm:txFillClrLst meth="repeat">
+      <a:schemeClr val="dk1"/>
+    </dgm:txFillClrLst>
+    <dgm:txEffectClrLst/>
+  </dgm:styleLbl>
+  <dgm:styleLbl name="solidAlignAcc1">
+    <dgm:fillClrLst meth="repeat">
+      <a:schemeClr val="lt1"/>
+    </dgm:fillClrLst>
+    <dgm:linClrLst>
+      <a:schemeClr val="accent4"/>
+      <a:schemeClr val="accent5"/>
+    </dgm:linClrLst>
+    <dgm:effectClrLst/>
+    <dgm:txLinClrLst/>
+    <dgm:txFillClrLst meth="repeat">
+      <a:schemeClr val="dk1"/>
+    </dgm:txFillClrLst>
+    <dgm:txEffectClrLst/>
+  </dgm:styleLbl>
+  <dgm:styleLbl name="solidBgAcc1">
+    <dgm:fillClrLst meth="repeat">
+      <a:schemeClr val="lt1"/>
+    </dgm:fillClrLst>
+    <dgm:linClrLst>
+      <a:schemeClr val="accent4"/>
+      <a:schemeClr val="accent5"/>
+    </dgm:linClrLst>
+    <dgm:effectClrLst/>
+    <dgm:txLinClrLst/>
+    <dgm:txFillClrLst meth="repeat">
+      <a:schemeClr val="dk1"/>
+    </dgm:txFillClrLst>
+    <dgm:txEffectClrLst/>
+  </dgm:styleLbl>
+  <dgm:styleLbl name="fgAccFollowNode1">
+    <dgm:fillClrLst>
+      <a:schemeClr val="accent4">
+        <a:tint val="40000"/>
+        <a:alpha val="90000"/>
+      </a:schemeClr>
+      <a:schemeClr val="accent5">
+        <a:tint val="40000"/>
+        <a:alpha val="90000"/>
+      </a:schemeClr>
+    </dgm:fillClrLst>
+    <dgm:linClrLst>
+      <a:schemeClr val="accent4">
+        <a:tint val="40000"/>
+        <a:alpha val="90000"/>
+      </a:schemeClr>
+      <a:schemeClr val="accent5">
+        <a:tint val="40000"/>
+        <a:alpha val="90000"/>
+      </a:schemeClr>
+    </dgm:linClrLst>
+    <dgm:effectClrLst/>
+    <dgm:txLinClrLst/>
+    <dgm:txFillClrLst meth="repeat">
+      <a:schemeClr val="dk1"/>
+    </dgm:txFillClrLst>
+    <dgm:txEffectClrLst/>
+  </dgm:styleLbl>
+  <dgm:styleLbl name="alignAccFollowNode1">
+    <dgm:fillClrLst>
+      <a:schemeClr val="accent4">
+        <a:tint val="40000"/>
+        <a:alpha val="90000"/>
+      </a:schemeClr>
+      <a:schemeClr val="accent5">
+        <a:tint val="40000"/>
+        <a:alpha val="90000"/>
+      </a:schemeClr>
+    </dgm:fillClrLst>
+    <dgm:linClrLst>
+      <a:schemeClr val="accent4">
+        <a:tint val="40000"/>
+        <a:alpha val="90000"/>
+      </a:schemeClr>
+      <a:schemeClr val="accent5">
+        <a:tint val="40000"/>
+        <a:alpha val="90000"/>
+      </a:schemeClr>
+    </dgm:linClrLst>
+    <dgm:effectClrLst/>
+    <dgm:txLinClrLst/>
+    <dgm:txFillClrLst meth="repeat">
+      <a:schemeClr val="dk1"/>
+    </dgm:txFillClrLst>
+    <dgm:txEffectClrLst/>
+  </dgm:styleLbl>
+  <dgm:styleLbl name="bgAccFollowNode1">
+    <dgm:fillClrLst>
+      <a:schemeClr val="accent4">
+        <a:tint val="40000"/>
+        <a:alpha val="90000"/>
+      </a:schemeClr>
+      <a:schemeClr val="accent5">
+        <a:tint val="40000"/>
+        <a:alpha val="90000"/>
+      </a:schemeClr>
+    </dgm:fillClrLst>
+    <dgm:linClrLst>
+      <a:schemeClr val="accent4">
+        <a:tint val="40000"/>
+        <a:alpha val="90000"/>
+      </a:schemeClr>
+      <a:schemeClr val="accent5">
+        <a:tint val="40000"/>
+        <a:alpha val="90000"/>
+      </a:schemeClr>
+    </dgm:linClrLst>
+    <dgm:effectClrLst/>
+    <dgm:txLinClrLst/>
+    <dgm:txFillClrLst meth="repeat">
+      <a:schemeClr val="dk1"/>
+    </dgm:txFillClrLst>
+    <dgm:txEffectClrLst/>
+  </dgm:styleLbl>
+  <dgm:styleLbl name="fgAcc0">
+    <dgm:fillClrLst meth="repeat">
+      <a:schemeClr val="lt1">
+        <a:alpha val="90000"/>
+      </a:schemeClr>
+    </dgm:fillClrLst>
+    <dgm:linClrLst>
+      <a:schemeClr val="accent3"/>
+    </dgm:linClrLst>
+    <dgm:effectClrLst/>
+    <dgm:txLinClrLst/>
+    <dgm:txFillClrLst meth="repeat">
+      <a:schemeClr val="dk1"/>
+    </dgm:txFillClrLst>
+    <dgm:txEffectClrLst/>
+  </dgm:styleLbl>
+  <dgm:styleLbl name="fgAcc2">
+    <dgm:fillClrLst meth="repeat">
+      <a:schemeClr val="lt1">
+        <a:alpha val="90000"/>
+      </a:schemeClr>
+    </dgm:fillClrLst>
+    <dgm:linClrLst>
+      <a:schemeClr val="accent5"/>
+    </dgm:linClrLst>
+    <dgm:effectClrLst/>
+    <dgm:txLinClrLst/>
+    <dgm:txFillClrLst meth="repeat">
+      <a:schemeClr val="dk1"/>
+    </dgm:txFillClrLst>
+    <dgm:txEffectClrLst/>
+  </dgm:styleLbl>
+  <dgm:styleLbl name="fgAcc3">
+    <dgm:fillClrLst meth="repeat">
+      <a:schemeClr val="lt1">
+        <a:alpha val="90000"/>
+      </a:schemeClr>
+    </dgm:fillClrLst>
+    <dgm:linClrLst>
+      <a:schemeClr val="accent6"/>
+    </dgm:linClrLst>
+    <dgm:effectClrLst/>
+    <dgm:txLinClrLst/>
+    <dgm:txFillClrLst meth="repeat">
+      <a:schemeClr val="dk1"/>
+    </dgm:txFillClrLst>
+    <dgm:txEffectClrLst/>
+  </dgm:styleLbl>
+  <dgm:styleLbl name="fgAcc4">
+    <dgm:fillClrLst meth="repeat">
+      <a:schemeClr val="lt1">
+        <a:alpha val="90000"/>
+      </a:schemeClr>
+    </dgm:fillClrLst>
+    <dgm:linClrLst>
+      <a:schemeClr val="accent1"/>
+    </dgm:linClrLst>
+    <dgm:effectClrLst/>
+    <dgm:txLinClrLst/>
+    <dgm:txFillClrLst meth="repeat">
+      <a:schemeClr val="dk1"/>
+    </dgm:txFillClrLst>
+    <dgm:txEffectClrLst/>
+  </dgm:styleLbl>
+  <dgm:styleLbl name="bgShp">
+    <dgm:fillClrLst meth="repeat">
+      <a:schemeClr val="accent4">
+        <a:tint val="40000"/>
+      </a:schemeClr>
+    </dgm:fillClrLst>
+    <dgm:linClrLst meth="repeat">
+      <a:schemeClr val="dk1"/>
+    </dgm:linClrLst>
+    <dgm:effectClrLst/>
+    <dgm:txLinClrLst/>
+    <dgm:txFillClrLst meth="repeat">
+      <a:schemeClr val="dk1"/>
+    </dgm:txFillClrLst>
+    <dgm:txEffectClrLst/>
+  </dgm:styleLbl>
+  <dgm:styleLbl name="dkBgShp">
+    <dgm:fillClrLst meth="repeat">
+      <a:schemeClr val="accent4">
+        <a:shade val="90000"/>
+      </a:schemeClr>
+    </dgm:fillClrLst>
+    <dgm:linClrLst meth="repeat">
+      <a:schemeClr val="dk1"/>
+    </dgm:linClrLst>
+    <dgm:effectClrLst/>
+    <dgm:txLinClrLst/>
+    <dgm:txFillClrLst meth="repeat">
+      <a:schemeClr val="lt1"/>
+    </dgm:txFillClrLst>
+    <dgm:txEffectClrLst/>
+  </dgm:styleLbl>
+  <dgm:styleLbl name="trBgShp">
+    <dgm:fillClrLst meth="repeat">
+      <a:schemeClr val="accent4">
+        <a:tint val="50000"/>
+        <a:alpha val="40000"/>
+      </a:schemeClr>
+    </dgm:fillClrLst>
+    <dgm:linClrLst meth="repeat">
+      <a:schemeClr val="accent4"/>
+    </dgm:linClrLst>
+    <dgm:effectClrLst/>
+    <dgm:txLinClrLst/>
+    <dgm:txFillClrLst meth="repeat">
+      <a:schemeClr val="lt1"/>
+    </dgm:txFillClrLst>
+    <dgm:txEffectClrLst/>
+  </dgm:styleLbl>
+  <dgm:styleLbl name="fgShp">
+    <dgm:fillClrLst meth="repeat">
+      <a:schemeClr val="accent4">
+        <a:tint val="40000"/>
+      </a:schemeClr>
+    </dgm:fillClrLst>
+    <dgm:linClrLst meth="repeat">
+      <a:schemeClr val="lt1"/>
+    </dgm:linClrLst>
+    <dgm:effectClrLst/>
+    <dgm:txLinClrLst/>
+    <dgm:txFillClrLst meth="repeat">
+      <a:schemeClr val="dk1"/>
+    </dgm:txFillClrLst>
+    <dgm:txEffectClrLst/>
+  </dgm:styleLbl>
+  <dgm:styleLbl name="revTx">
+    <dgm:fillClrLst meth="repeat">
+      <a:schemeClr val="lt1">
+        <a:alpha val="0"/>
+      </a:schemeClr>
+    </dgm:fillClrLst>
+    <dgm:linClrLst meth="repeat">
+      <a:schemeClr val="dk1">
+        <a:alpha val="0"/>
+      </a:schemeClr>
+    </dgm:linClrLst>
+    <dgm:effectClrLst/>
+    <dgm:txLinClrLst/>
+    <dgm:txFillClrLst meth="repeat">
+      <a:schemeClr val="tx1"/>
+    </dgm:txFillClrLst>
+    <dgm:txEffectClrLst/>
+  </dgm:styleLbl>
+</dgm:colorsDef>
+</file>
+
+<file path=ppt/diagrams/data1.xml><?xml version="1.0" encoding="utf-8"?>
+<dgm:dataModel xmlns:dgm="http://schemas.openxmlformats.org/drawingml/2006/diagram" xmlns:a="http://schemas.openxmlformats.org/drawingml/2006/main">
+  <dgm:ptLst>
+    <dgm:pt modelId="{064202E9-EEB8-3F4C-B647-C601F6E5B9FC}" type="doc">
+      <dgm:prSet loTypeId="urn:microsoft.com/office/officeart/2005/8/layout/cycle1" loCatId="" qsTypeId="urn:microsoft.com/office/officeart/2005/8/quickstyle/simple1" qsCatId="simple" csTypeId="urn:microsoft.com/office/officeart/2005/8/colors/colorful4" csCatId="colorful" phldr="1"/>
+      <dgm:spPr/>
+      <dgm:t>
+        <a:bodyPr/>
+        <a:lstStyle/>
+        <a:p>
+          <a:endParaRPr lang="en-GB"/>
+        </a:p>
+      </dgm:t>
+    </dgm:pt>
+    <dgm:pt modelId="{8AC703CC-670A-0148-96DC-573E2A8080C5}">
+      <dgm:prSet phldrT="[Text]"/>
+      <dgm:spPr/>
+      <dgm:t>
+        <a:bodyPr/>
+        <a:lstStyle/>
+        <a:p>
+          <a:r>
+            <a:rPr lang="en-GB"/>
+            <a:t>Genetics</a:t>
+          </a:r>
+        </a:p>
+      </dgm:t>
+    </dgm:pt>
+    <dgm:pt modelId="{6B063D2F-9005-1A4E-A7A8-49E8157C8FB2}" type="parTrans" cxnId="{9A6C65AD-7A41-4748-B1DD-A1891AD5972F}">
+      <dgm:prSet/>
+      <dgm:spPr/>
+      <dgm:t>
+        <a:bodyPr/>
+        <a:lstStyle/>
+        <a:p>
+          <a:endParaRPr lang="en-GB"/>
+        </a:p>
+      </dgm:t>
+    </dgm:pt>
+    <dgm:pt modelId="{ABCE7703-C35E-C849-B01D-4E195B0A46AB}" type="sibTrans" cxnId="{9A6C65AD-7A41-4748-B1DD-A1891AD5972F}">
+      <dgm:prSet/>
+      <dgm:spPr/>
+      <dgm:t>
+        <a:bodyPr/>
+        <a:lstStyle/>
+        <a:p>
+          <a:endParaRPr lang="en-GB"/>
+        </a:p>
+      </dgm:t>
+    </dgm:pt>
+    <dgm:pt modelId="{6509617D-6DAF-C448-99B5-F92F400615DB}">
+      <dgm:prSet phldrT="[Text]"/>
+      <dgm:spPr/>
+      <dgm:t>
+        <a:bodyPr/>
+        <a:lstStyle/>
+        <a:p>
+          <a:r>
+            <a:rPr lang="en-GB"/>
+            <a:t>Society</a:t>
+          </a:r>
+        </a:p>
+      </dgm:t>
+    </dgm:pt>
+    <dgm:pt modelId="{9895FEDB-913C-654F-AF33-FB62B98E86DC}" type="parTrans" cxnId="{24CC1DF7-C558-1F45-815D-C435FC047C26}">
+      <dgm:prSet/>
+      <dgm:spPr/>
+      <dgm:t>
+        <a:bodyPr/>
+        <a:lstStyle/>
+        <a:p>
+          <a:endParaRPr lang="en-GB"/>
+        </a:p>
+      </dgm:t>
+    </dgm:pt>
+    <dgm:pt modelId="{92040770-FB5E-B74D-8C84-81AF3A8CB0EA}" type="sibTrans" cxnId="{24CC1DF7-C558-1F45-815D-C435FC047C26}">
+      <dgm:prSet/>
+      <dgm:spPr/>
+      <dgm:t>
+        <a:bodyPr/>
+        <a:lstStyle/>
+        <a:p>
+          <a:endParaRPr lang="en-GB"/>
+        </a:p>
+      </dgm:t>
+    </dgm:pt>
+    <dgm:pt modelId="{C3213A5F-469C-D745-9A82-631A7D80A9E9}" type="pres">
+      <dgm:prSet presAssocID="{064202E9-EEB8-3F4C-B647-C601F6E5B9FC}" presName="cycle" presStyleCnt="0">
+        <dgm:presLayoutVars>
+          <dgm:dir/>
+          <dgm:resizeHandles val="exact"/>
+        </dgm:presLayoutVars>
+      </dgm:prSet>
+      <dgm:spPr/>
+    </dgm:pt>
+    <dgm:pt modelId="{AAABD95D-11FF-4444-ADF1-9DB92A3953F1}" type="pres">
+      <dgm:prSet presAssocID="{8AC703CC-670A-0148-96DC-573E2A8080C5}" presName="dummy" presStyleCnt="0"/>
+      <dgm:spPr/>
+    </dgm:pt>
+    <dgm:pt modelId="{FAE369A0-546B-5F44-B572-F9DA2B10E04C}" type="pres">
+      <dgm:prSet presAssocID="{8AC703CC-670A-0148-96DC-573E2A8080C5}" presName="node" presStyleLbl="revTx" presStyleIdx="0" presStyleCnt="2">
+        <dgm:presLayoutVars>
+          <dgm:bulletEnabled val="1"/>
+        </dgm:presLayoutVars>
+      </dgm:prSet>
+      <dgm:spPr/>
+    </dgm:pt>
+    <dgm:pt modelId="{1B4FBE8E-21FE-C641-BFE7-1E41DBE02F4D}" type="pres">
+      <dgm:prSet presAssocID="{ABCE7703-C35E-C849-B01D-4E195B0A46AB}" presName="sibTrans" presStyleLbl="node1" presStyleIdx="0" presStyleCnt="2"/>
+      <dgm:spPr/>
+    </dgm:pt>
+    <dgm:pt modelId="{AF38DD2B-4869-E04F-BBD0-7C1FEE918C0F}" type="pres">
+      <dgm:prSet presAssocID="{6509617D-6DAF-C448-99B5-F92F400615DB}" presName="dummy" presStyleCnt="0"/>
+      <dgm:spPr/>
+    </dgm:pt>
+    <dgm:pt modelId="{0D7B3773-460F-EC45-A63D-CD79101D9E35}" type="pres">
+      <dgm:prSet presAssocID="{6509617D-6DAF-C448-99B5-F92F400615DB}" presName="node" presStyleLbl="revTx" presStyleIdx="1" presStyleCnt="2">
+        <dgm:presLayoutVars>
+          <dgm:bulletEnabled val="1"/>
+        </dgm:presLayoutVars>
+      </dgm:prSet>
+      <dgm:spPr/>
+    </dgm:pt>
+    <dgm:pt modelId="{D2CD56B7-1942-4546-BFE9-38575718A3C7}" type="pres">
+      <dgm:prSet presAssocID="{92040770-FB5E-B74D-8C84-81AF3A8CB0EA}" presName="sibTrans" presStyleLbl="node1" presStyleIdx="1" presStyleCnt="2"/>
+      <dgm:spPr/>
+    </dgm:pt>
+  </dgm:ptLst>
+  <dgm:cxnLst>
+    <dgm:cxn modelId="{9B19940D-EABA-4244-8F0D-258035A7DD0B}" type="presOf" srcId="{ABCE7703-C35E-C849-B01D-4E195B0A46AB}" destId="{1B4FBE8E-21FE-C641-BFE7-1E41DBE02F4D}" srcOrd="0" destOrd="0" presId="urn:microsoft.com/office/officeart/2005/8/layout/cycle1"/>
+    <dgm:cxn modelId="{9153FE63-1B5E-384D-8698-5B95F316425A}" type="presOf" srcId="{064202E9-EEB8-3F4C-B647-C601F6E5B9FC}" destId="{C3213A5F-469C-D745-9A82-631A7D80A9E9}" srcOrd="0" destOrd="0" presId="urn:microsoft.com/office/officeart/2005/8/layout/cycle1"/>
+    <dgm:cxn modelId="{E2F0A888-A091-D54E-ABA4-24FF8F50D76C}" type="presOf" srcId="{8AC703CC-670A-0148-96DC-573E2A8080C5}" destId="{FAE369A0-546B-5F44-B572-F9DA2B10E04C}" srcOrd="0" destOrd="0" presId="urn:microsoft.com/office/officeart/2005/8/layout/cycle1"/>
+    <dgm:cxn modelId="{317FBD92-AA91-1746-9C4B-24656CCF8D0B}" type="presOf" srcId="{6509617D-6DAF-C448-99B5-F92F400615DB}" destId="{0D7B3773-460F-EC45-A63D-CD79101D9E35}" srcOrd="0" destOrd="0" presId="urn:microsoft.com/office/officeart/2005/8/layout/cycle1"/>
+    <dgm:cxn modelId="{9A6C65AD-7A41-4748-B1DD-A1891AD5972F}" srcId="{064202E9-EEB8-3F4C-B647-C601F6E5B9FC}" destId="{8AC703CC-670A-0148-96DC-573E2A8080C5}" srcOrd="0" destOrd="0" parTransId="{6B063D2F-9005-1A4E-A7A8-49E8157C8FB2}" sibTransId="{ABCE7703-C35E-C849-B01D-4E195B0A46AB}"/>
+    <dgm:cxn modelId="{A94F14CD-DAF3-F54A-B2CE-0978AF53D8EB}" type="presOf" srcId="{92040770-FB5E-B74D-8C84-81AF3A8CB0EA}" destId="{D2CD56B7-1942-4546-BFE9-38575718A3C7}" srcOrd="0" destOrd="0" presId="urn:microsoft.com/office/officeart/2005/8/layout/cycle1"/>
+    <dgm:cxn modelId="{24CC1DF7-C558-1F45-815D-C435FC047C26}" srcId="{064202E9-EEB8-3F4C-B647-C601F6E5B9FC}" destId="{6509617D-6DAF-C448-99B5-F92F400615DB}" srcOrd="1" destOrd="0" parTransId="{9895FEDB-913C-654F-AF33-FB62B98E86DC}" sibTransId="{92040770-FB5E-B74D-8C84-81AF3A8CB0EA}"/>
+    <dgm:cxn modelId="{4F1124C7-56CA-484B-A8A5-B945FDF4DBED}" type="presParOf" srcId="{C3213A5F-469C-D745-9A82-631A7D80A9E9}" destId="{AAABD95D-11FF-4444-ADF1-9DB92A3953F1}" srcOrd="0" destOrd="0" presId="urn:microsoft.com/office/officeart/2005/8/layout/cycle1"/>
+    <dgm:cxn modelId="{3B9D1D11-37B5-9B41-B3B9-D6439B72E368}" type="presParOf" srcId="{C3213A5F-469C-D745-9A82-631A7D80A9E9}" destId="{FAE369A0-546B-5F44-B572-F9DA2B10E04C}" srcOrd="1" destOrd="0" presId="urn:microsoft.com/office/officeart/2005/8/layout/cycle1"/>
+    <dgm:cxn modelId="{B308D4D1-BD54-724A-9E59-0112D4C5EABD}" type="presParOf" srcId="{C3213A5F-469C-D745-9A82-631A7D80A9E9}" destId="{1B4FBE8E-21FE-C641-BFE7-1E41DBE02F4D}" srcOrd="2" destOrd="0" presId="urn:microsoft.com/office/officeart/2005/8/layout/cycle1"/>
+    <dgm:cxn modelId="{4663552C-14FE-F043-B68F-8C73BBCFD4D3}" type="presParOf" srcId="{C3213A5F-469C-D745-9A82-631A7D80A9E9}" destId="{AF38DD2B-4869-E04F-BBD0-7C1FEE918C0F}" srcOrd="3" destOrd="0" presId="urn:microsoft.com/office/officeart/2005/8/layout/cycle1"/>
+    <dgm:cxn modelId="{42A340AC-8CBD-2A4C-A120-8E7E2DA1EEB8}" type="presParOf" srcId="{C3213A5F-469C-D745-9A82-631A7D80A9E9}" destId="{0D7B3773-460F-EC45-A63D-CD79101D9E35}" srcOrd="4" destOrd="0" presId="urn:microsoft.com/office/officeart/2005/8/layout/cycle1"/>
+    <dgm:cxn modelId="{DA3A5BE1-BC3C-9342-AB43-E04B1E7F2FDE}" type="presParOf" srcId="{C3213A5F-469C-D745-9A82-631A7D80A9E9}" destId="{D2CD56B7-1942-4546-BFE9-38575718A3C7}" srcOrd="5" destOrd="0" presId="urn:microsoft.com/office/officeart/2005/8/layout/cycle1"/>
+  </dgm:cxnLst>
+  <dgm:bg/>
+  <dgm:whole/>
+  <dgm:extLst>
+    <a:ext uri="http://schemas.microsoft.com/office/drawing/2008/diagram">
+      <dsp:dataModelExt xmlns:dsp="http://schemas.microsoft.com/office/drawing/2008/diagram" relId="rId8" minVer="http://schemas.openxmlformats.org/drawingml/2006/diagram"/>
+    </a:ext>
+  </dgm:extLst>
+</dgm:dataModel>
+</file>
+
+<file path=ppt/diagrams/drawing1.xml><?xml version="1.0" encoding="utf-8"?>
+<dsp:drawing xmlns:dgm="http://schemas.openxmlformats.org/drawingml/2006/diagram" xmlns:dsp="http://schemas.microsoft.com/office/drawing/2008/diagram" xmlns:a="http://schemas.openxmlformats.org/drawingml/2006/main">
+  <dsp:spTree>
+    <dsp:nvGrpSpPr>
+      <dsp:cNvPr id="0" name=""/>
+      <dsp:cNvGrpSpPr/>
+    </dsp:nvGrpSpPr>
+    <dsp:grpSpPr/>
+    <dsp:sp modelId="{FAE369A0-546B-5F44-B572-F9DA2B10E04C}">
+      <dsp:nvSpPr>
+        <dsp:cNvPr id="0" name=""/>
+        <dsp:cNvSpPr/>
+      </dsp:nvSpPr>
+      <dsp:spPr>
+        <a:xfrm>
+          <a:off x="2826088" y="1173583"/>
+          <a:ext cx="1728273" cy="1728273"/>
+        </a:xfrm>
+        <a:prstGeom prst="rect">
+          <a:avLst/>
+        </a:prstGeom>
+        <a:noFill/>
+        <a:ln>
+          <a:noFill/>
+        </a:ln>
+        <a:effectLst/>
+      </dsp:spPr>
+      <dsp:style>
+        <a:lnRef idx="0">
+          <a:scrgbClr r="0" g="0" b="0"/>
+        </a:lnRef>
+        <a:fillRef idx="0">
+          <a:scrgbClr r="0" g="0" b="0"/>
+        </a:fillRef>
+        <a:effectRef idx="0">
+          <a:scrgbClr r="0" g="0" b="0"/>
+        </a:effectRef>
+        <a:fontRef idx="minor"/>
+      </dsp:style>
+      <dsp:txBody>
+        <a:bodyPr spcFirstLastPara="0" vert="horz" wrap="square" lIns="45720" tIns="45720" rIns="45720" bIns="45720" numCol="1" spcCol="1270" anchor="ctr" anchorCtr="0">
+          <a:noAutofit/>
+        </a:bodyPr>
+        <a:lstStyle/>
+        <a:p>
+          <a:pPr marL="0" lvl="0" indent="0" algn="ctr" defTabSz="1600200">
+            <a:lnSpc>
+              <a:spcPct val="90000"/>
+            </a:lnSpc>
+            <a:spcBef>
+              <a:spcPct val="0"/>
+            </a:spcBef>
+            <a:spcAft>
+              <a:spcPct val="35000"/>
+            </a:spcAft>
+            <a:buNone/>
+          </a:pPr>
+          <a:r>
+            <a:rPr lang="en-GB" sz="3600" kern="1200"/>
+            <a:t>Genetics</a:t>
+          </a:r>
+        </a:p>
+      </dsp:txBody>
+      <dsp:txXfrm>
+        <a:off x="2826088" y="1173583"/>
+        <a:ext cx="1728273" cy="1728273"/>
+      </dsp:txXfrm>
+    </dsp:sp>
+    <dsp:sp modelId="{1B4FBE8E-21FE-C641-BFE7-1E41DBE02F4D}">
+      <dsp:nvSpPr>
+        <dsp:cNvPr id="0" name=""/>
+        <dsp:cNvSpPr/>
+      </dsp:nvSpPr>
+      <dsp:spPr>
+        <a:xfrm>
+          <a:off x="500023" y="260070"/>
+          <a:ext cx="3555299" cy="3555299"/>
+        </a:xfrm>
+        <a:prstGeom prst="circularArrow">
+          <a:avLst>
+            <a:gd name="adj1" fmla="val 9479"/>
+            <a:gd name="adj2" fmla="val 684626"/>
+            <a:gd name="adj3" fmla="val 7852382"/>
+            <a:gd name="adj4" fmla="val 2262993"/>
+            <a:gd name="adj5" fmla="val 11059"/>
+          </a:avLst>
+        </a:prstGeom>
+        <a:solidFill>
+          <a:schemeClr val="accent4">
+            <a:hueOff val="0"/>
+            <a:satOff val="0"/>
+            <a:lumOff val="0"/>
+            <a:alphaOff val="0"/>
+          </a:schemeClr>
+        </a:solidFill>
+        <a:ln w="12700" cap="flat" cmpd="sng" algn="ctr">
+          <a:solidFill>
+            <a:schemeClr val="lt1">
+              <a:hueOff val="0"/>
+              <a:satOff val="0"/>
+              <a:lumOff val="0"/>
+              <a:alphaOff val="0"/>
+            </a:schemeClr>
+          </a:solidFill>
+          <a:prstDash val="solid"/>
+          <a:miter lim="800000"/>
+        </a:ln>
+        <a:effectLst/>
+      </dsp:spPr>
+      <dsp:style>
+        <a:lnRef idx="2">
+          <a:scrgbClr r="0" g="0" b="0"/>
+        </a:lnRef>
+        <a:fillRef idx="1">
+          <a:scrgbClr r="0" g="0" b="0"/>
+        </a:fillRef>
+        <a:effectRef idx="0">
+          <a:scrgbClr r="0" g="0" b="0"/>
+        </a:effectRef>
+        <a:fontRef idx="minor">
+          <a:schemeClr val="lt1"/>
+        </a:fontRef>
+      </dsp:style>
+    </dsp:sp>
+    <dsp:sp modelId="{0D7B3773-460F-EC45-A63D-CD79101D9E35}">
+      <dsp:nvSpPr>
+        <dsp:cNvPr id="0" name=""/>
+        <dsp:cNvSpPr/>
+      </dsp:nvSpPr>
+      <dsp:spPr>
+        <a:xfrm>
+          <a:off x="984" y="1173583"/>
+          <a:ext cx="1728273" cy="1728273"/>
+        </a:xfrm>
+        <a:prstGeom prst="rect">
+          <a:avLst/>
+        </a:prstGeom>
+        <a:noFill/>
+        <a:ln>
+          <a:noFill/>
+        </a:ln>
+        <a:effectLst/>
+      </dsp:spPr>
+      <dsp:style>
+        <a:lnRef idx="0">
+          <a:scrgbClr r="0" g="0" b="0"/>
+        </a:lnRef>
+        <a:fillRef idx="0">
+          <a:scrgbClr r="0" g="0" b="0"/>
+        </a:fillRef>
+        <a:effectRef idx="0">
+          <a:scrgbClr r="0" g="0" b="0"/>
+        </a:effectRef>
+        <a:fontRef idx="minor"/>
+      </dsp:style>
+      <dsp:txBody>
+        <a:bodyPr spcFirstLastPara="0" vert="horz" wrap="square" lIns="45720" tIns="45720" rIns="45720" bIns="45720" numCol="1" spcCol="1270" anchor="ctr" anchorCtr="0">
+          <a:noAutofit/>
+        </a:bodyPr>
+        <a:lstStyle/>
+        <a:p>
+          <a:pPr marL="0" lvl="0" indent="0" algn="ctr" defTabSz="1600200">
+            <a:lnSpc>
+              <a:spcPct val="90000"/>
+            </a:lnSpc>
+            <a:spcBef>
+              <a:spcPct val="0"/>
+            </a:spcBef>
+            <a:spcAft>
+              <a:spcPct val="35000"/>
+            </a:spcAft>
+            <a:buNone/>
+          </a:pPr>
+          <a:r>
+            <a:rPr lang="en-GB" sz="3600" kern="1200"/>
+            <a:t>Society</a:t>
+          </a:r>
+        </a:p>
+      </dsp:txBody>
+      <dsp:txXfrm>
+        <a:off x="984" y="1173583"/>
+        <a:ext cx="1728273" cy="1728273"/>
+      </dsp:txXfrm>
+    </dsp:sp>
+    <dsp:sp modelId="{D2CD56B7-1942-4546-BFE9-38575718A3C7}">
+      <dsp:nvSpPr>
+        <dsp:cNvPr id="0" name=""/>
+        <dsp:cNvSpPr/>
+      </dsp:nvSpPr>
+      <dsp:spPr>
+        <a:xfrm>
+          <a:off x="500023" y="260070"/>
+          <a:ext cx="3555299" cy="3555299"/>
+        </a:xfrm>
+        <a:prstGeom prst="circularArrow">
+          <a:avLst>
+            <a:gd name="adj1" fmla="val 9479"/>
+            <a:gd name="adj2" fmla="val 684626"/>
+            <a:gd name="adj3" fmla="val 18652382"/>
+            <a:gd name="adj4" fmla="val 13062993"/>
+            <a:gd name="adj5" fmla="val 11059"/>
+          </a:avLst>
+        </a:prstGeom>
+        <a:solidFill>
+          <a:schemeClr val="accent4">
+            <a:hueOff val="10395692"/>
+            <a:satOff val="-47968"/>
+            <a:lumOff val="1765"/>
+            <a:alphaOff val="0"/>
+          </a:schemeClr>
+        </a:solidFill>
+        <a:ln w="12700" cap="flat" cmpd="sng" algn="ctr">
+          <a:solidFill>
+            <a:schemeClr val="lt1">
+              <a:hueOff val="0"/>
+              <a:satOff val="0"/>
+              <a:lumOff val="0"/>
+              <a:alphaOff val="0"/>
+            </a:schemeClr>
+          </a:solidFill>
+          <a:prstDash val="solid"/>
+          <a:miter lim="800000"/>
+        </a:ln>
+        <a:effectLst/>
+      </dsp:spPr>
+      <dsp:style>
+        <a:lnRef idx="2">
+          <a:scrgbClr r="0" g="0" b="0"/>
+        </a:lnRef>
+        <a:fillRef idx="1">
+          <a:scrgbClr r="0" g="0" b="0"/>
+        </a:fillRef>
+        <a:effectRef idx="0">
+          <a:scrgbClr r="0" g="0" b="0"/>
+        </a:effectRef>
+        <a:fontRef idx="minor">
+          <a:schemeClr val="lt1"/>
+        </a:fontRef>
+      </dsp:style>
+    </dsp:sp>
+  </dsp:spTree>
+</dsp:drawing>
+</file>
+
+<file path=ppt/diagrams/layout1.xml><?xml version="1.0" encoding="utf-8"?>
+<dgm:layoutDef xmlns:dgm="http://schemas.openxmlformats.org/drawingml/2006/diagram" xmlns:a="http://schemas.openxmlformats.org/drawingml/2006/main" uniqueId="urn:microsoft.com/office/officeart/2005/8/layout/cycle1">
+  <dgm:title val=""/>
+  <dgm:desc val=""/>
+  <dgm:catLst>
+    <dgm:cat type="cycle" pri="2000"/>
+  </dgm:catLst>
+  <dgm:sampData>
+    <dgm:dataModel>
+      <dgm:ptLst>
+        <dgm:pt modelId="0" type="doc"/>
+        <dgm:pt modelId="1">
+          <dgm:prSet phldr="1"/>
+        </dgm:pt>
+        <dgm:pt modelId="2">
+          <dgm:prSet phldr="1"/>
+        </dgm:pt>
+        <dgm:pt modelId="3">
+          <dgm:prSet phldr="1"/>
+        </dgm:pt>
+        <dgm:pt modelId="4">
+          <dgm:prSet phldr="1"/>
+        </dgm:pt>
+        <dgm:pt modelId="5">
+          <dgm:prSet phldr="1"/>
+        </dgm:pt>
+      </dgm:ptLst>
+      <dgm:cxnLst>
+        <dgm:cxn modelId="6" srcId="0" destId="1" srcOrd="0" destOrd="0"/>
+        <dgm:cxn modelId="7" srcId="0" destId="2" srcOrd="1" destOrd="0"/>
+        <dgm:cxn modelId="8" srcId="0" destId="3" srcOrd="2" destOrd="0"/>
+        <dgm:cxn modelId="9" srcId="0" destId="4" srcOrd="3" destOrd="0"/>
+        <dgm:cxn modelId="10" srcId="0" destId="5" srcOrd="4" destOrd="0"/>
+      </dgm:cxnLst>
+      <dgm:bg/>
+      <dgm:whole/>
+    </dgm:dataModel>
+  </dgm:sampData>
+  <dgm:styleData>
+    <dgm:dataModel>
+      <dgm:ptLst>
+        <dgm:pt modelId="0" type="doc"/>
+        <dgm:pt modelId="1"/>
+        <dgm:pt modelId="2"/>
+        <dgm:pt modelId="3"/>
+      </dgm:ptLst>
+      <dgm:cxnLst>
+        <dgm:cxn modelId="4" srcId="0" destId="1" srcOrd="0" destOrd="0"/>
+        <dgm:cxn modelId="5" srcId="0" destId="2" srcOrd="1" destOrd="0"/>
+        <dgm:cxn modelId="6" srcId="0" destId="3" srcOrd="2" destOrd="0"/>
+      </dgm:cxnLst>
+      <dgm:bg/>
+      <dgm:whole/>
+    </dgm:dataModel>
+  </dgm:styleData>
+  <dgm:clrData>
+    <dgm:dataModel>
+      <dgm:ptLst>
+        <dgm:pt modelId="0" type="doc"/>
+        <dgm:pt modelId="1"/>
+        <dgm:pt modelId="2"/>
+        <dgm:pt modelId="3"/>
+        <dgm:pt modelId="4"/>
+        <dgm:pt modelId="5"/>
+        <dgm:pt modelId="6"/>
+      </dgm:ptLst>
+      <dgm:cxnLst>
+        <dgm:cxn modelId="7" srcId="0" destId="1" srcOrd="0" destOrd="0"/>
+        <dgm:cxn modelId="8" srcId="0" destId="2" srcOrd="1" destOrd="0"/>
+        <dgm:cxn modelId="9" srcId="0" destId="3" srcOrd="2" destOrd="0"/>
+        <dgm:cxn modelId="10" srcId="0" destId="4" srcOrd="3" destOrd="0"/>
+        <dgm:cxn modelId="11" srcId="0" destId="5" srcOrd="4" destOrd="0"/>
+        <dgm:cxn modelId="12" srcId="0" destId="6" srcOrd="5" destOrd="0"/>
+      </dgm:cxnLst>
+      <dgm:bg/>
+      <dgm:whole/>
+    </dgm:dataModel>
+  </dgm:clrData>
+  <dgm:layoutNode name="cycle">
+    <dgm:varLst>
+      <dgm:dir/>
+      <dgm:resizeHandles val="exact"/>
+    </dgm:varLst>
+    <dgm:choose name="Name0">
+      <dgm:if name="Name1" func="var" arg="dir" op="equ" val="norm">
+        <dgm:alg type="cycle">
+          <dgm:param type="stAng" val="0"/>
+          <dgm:param type="spanAng" val="360"/>
+        </dgm:alg>
+      </dgm:if>
+      <dgm:else name="Name2">
+        <dgm:alg type="cycle">
+          <dgm:param type="stAng" val="0"/>
+          <dgm:param type="spanAng" val="-360"/>
+        </dgm:alg>
+      </dgm:else>
+    </dgm:choose>
+    <dgm:shape xmlns:r="http://schemas.openxmlformats.org/officeDocument/2006/relationships" r:blip="">
+      <dgm:adjLst/>
+    </dgm:shape>
+    <dgm:presOf/>
+    <dgm:choose name="Name3">
+      <dgm:if name="Name4" func="var" arg="dir" op="equ" val="norm">
+        <dgm:constrLst>
+          <dgm:constr type="diam" val="1"/>
+          <dgm:constr type="w" for="ch" forName="node" refType="w"/>
+          <dgm:constr type="w" for="ch" ptType="sibTrans" refType="w" refFor="ch" refForName="node" fact="0.5"/>
+          <dgm:constr type="h" for="ch" ptType="sibTrans" op="equ"/>
+          <dgm:constr type="diam" for="ch" ptType="sibTrans" refType="diam" op="equ"/>
+          <dgm:constr type="sibSp" refType="w" refFor="ch" refForName="node" fact="0.15"/>
+          <dgm:constr type="w" for="ch" forName="dummy" refType="sibSp" fact="2.8"/>
+          <dgm:constr type="primFontSz" for="ch" forName="node" op="equ" val="65"/>
+        </dgm:constrLst>
+      </dgm:if>
+      <dgm:else name="Name5">
+        <dgm:constrLst>
+          <dgm:constr type="diam" val="1"/>
+          <dgm:constr type="w" for="ch" forName="node" refType="w"/>
+          <dgm:constr type="w" for="ch" ptType="sibTrans" refType="w" refFor="ch" refForName="node" fact="0.5"/>
+          <dgm:constr type="h" for="ch" ptType="sibTrans" op="equ"/>
+          <dgm:constr type="diam" for="ch" ptType="sibTrans" refType="diam" op="equ" fact="-1"/>
+          <dgm:constr type="sibSp" refType="w" refFor="ch" refForName="node" fact="0.15"/>
+          <dgm:constr type="w" for="ch" forName="dummy" refType="sibSp" fact="2.8"/>
+          <dgm:constr type="primFontSz" for="ch" forName="node" op="equ" val="65"/>
+        </dgm:constrLst>
+      </dgm:else>
+    </dgm:choose>
+    <dgm:ruleLst>
+      <dgm:rule type="diam" val="INF" fact="NaN" max="NaN"/>
+    </dgm:ruleLst>
+    <dgm:forEach name="nodesForEach" axis="ch" ptType="node">
+      <dgm:choose name="Name6">
+        <dgm:if name="Name7" axis="par ch" ptType="doc node" func="cnt" op="gt" val="1">
+          <dgm:layoutNode name="dummy">
+            <dgm:alg type="sp"/>
+            <dgm:shape xmlns:r="http://schemas.openxmlformats.org/officeDocument/2006/relationships" r:blip="">
+              <dgm:adjLst/>
+            </dgm:shape>
+            <dgm:presOf/>
+            <dgm:constrLst>
+              <dgm:constr type="h" refType="w"/>
+            </dgm:constrLst>
+            <dgm:ruleLst/>
+          </dgm:layoutNode>
+        </dgm:if>
+        <dgm:else name="Name8"/>
+      </dgm:choose>
+      <dgm:layoutNode name="node" styleLbl="revTx">
+        <dgm:varLst>
+          <dgm:bulletEnabled val="1"/>
+        </dgm:varLst>
+        <dgm:alg type="tx">
+          <dgm:param type="txAnchorVertCh" val="mid"/>
+        </dgm:alg>
+        <dgm:shape xmlns:r="http://schemas.openxmlformats.org/officeDocument/2006/relationships" type="rect" r:blip="">
+          <dgm:adjLst/>
+        </dgm:shape>
+        <dgm:presOf axis="desOrSelf" ptType="node"/>
+        <dgm:constrLst>
+          <dgm:constr type="h" refType="w"/>
+          <dgm:constr type="lMarg" refType="primFontSz" fact="0.1"/>
+          <dgm:constr type="rMarg" refType="primFontSz" fact="0.1"/>
+          <dgm:constr type="tMarg" refType="primFontSz" fact="0.1"/>
+          <dgm:constr type="bMarg" refType="primFontSz" fact="0.1"/>
+        </dgm:constrLst>
+        <dgm:ruleLst>
+          <dgm:rule type="primFontSz" val="5" fact="NaN" max="NaN"/>
+        </dgm:ruleLst>
+      </dgm:layoutNode>
+      <dgm:choose name="Name9">
+        <dgm:if name="Name10" axis="par ch" ptType="doc node" func="cnt" op="gt" val="1">
+          <dgm:forEach name="Name11" axis="followSib" ptType="sibTrans" hideLastTrans="0" cnt="1">
+            <dgm:layoutNode name="sibTrans" styleLbl="node1">
+              <dgm:alg type="conn">
+                <dgm:param type="connRout" val="curve"/>
+                <dgm:param type="begPts" val="radial"/>
+                <dgm:param type="endPts" val="radial"/>
+              </dgm:alg>
+              <dgm:shape xmlns:r="http://schemas.openxmlformats.org/officeDocument/2006/relationships" type="conn" r:blip="">
+                <dgm:adjLst/>
+              </dgm:shape>
+              <dgm:presOf axis="self"/>
+              <dgm:constrLst>
+                <dgm:constr type="h" refType="w" fact="0.65"/>
+                <dgm:constr type="begPad"/>
+                <dgm:constr type="endPad"/>
+              </dgm:constrLst>
+              <dgm:ruleLst/>
+            </dgm:layoutNode>
+          </dgm:forEach>
+        </dgm:if>
+        <dgm:else name="Name12"/>
+      </dgm:choose>
+    </dgm:forEach>
+  </dgm:layoutNode>
+</dgm:layoutDef>
+</file>
+
+<file path=ppt/diagrams/quickStyle1.xml><?xml version="1.0" encoding="utf-8"?>
+<dgm:styleDef xmlns:dgm="http://schemas.openxmlformats.org/drawingml/2006/diagram" xmlns:a="http://schemas.openxmlformats.org/drawingml/2006/main" uniqueId="urn:microsoft.com/office/officeart/2005/8/quickstyle/simple1">
+  <dgm:title val=""/>
+  <dgm:desc val=""/>
+  <dgm:catLst>
+    <dgm:cat type="simple" pri="10100"/>
+  </dgm:catLst>
+  <dgm:scene3d>
+    <a:camera prst="orthographicFront"/>
+    <a:lightRig rig="threePt" dir="t"/>
+  </dgm:scene3d>
+  <dgm:styleLbl name="node0">
+    <dgm:scene3d>
+      <a:camera prst="orthographicFront"/>
+      <a:lightRig rig="threePt" dir="t"/>
+    </dgm:scene3d>
+    <dgm:sp3d/>
+    <dgm:txPr/>
+    <dgm:style>
+      <a:lnRef idx="2">
+        <a:scrgbClr r="0" g="0" b="0"/>
+      </a:lnRef>
+      <a:fillRef idx="1">
+        <a:scrgbClr r="0" g="0" b="0"/>
+      </a:fillRef>
+      <a:effectRef idx="0">
+        <a:scrgbClr r="0" g="0" b="0"/>
+      </a:effectRef>
+      <a:fontRef idx="minor">
+        <a:schemeClr val="lt1"/>
+      </a:fontRef>
+    </dgm:style>
+  </dgm:styleLbl>
+  <dgm:styleLbl name="lnNode1">
+    <dgm:scene3d>
+      <a:camera prst="orthographicFront"/>
+      <a:lightRig rig="threePt" dir="t"/>
+    </dgm:scene3d>
+    <dgm:sp3d/>
+    <dgm:txPr/>
+    <dgm:style>
+      <a:lnRef idx="2">
+        <a:scrgbClr r="0" g="0" b="0"/>
+      </a:lnRef>
+      <a:fillRef idx="1">
+        <a:scrgbClr r="0" g="0" b="0"/>
+      </a:fillRef>
+      <a:effectRef idx="0">
+        <a:scrgbClr r="0" g="0" b="0"/>
+      </a:effectRef>
+      <a:fontRef idx="minor">
+        <a:schemeClr val="lt1"/>
+      </a:fontRef>
+    </dgm:style>
+  </dgm:styleLbl>
+  <dgm:styleLbl name="vennNode1">
+    <dgm:scene3d>
+      <a:camera prst="orthographicFront"/>
+      <a:lightRig rig="threePt" dir="t"/>
+    </dgm:scene3d>
+    <dgm:sp3d/>
+    <dgm:txPr/>
+    <dgm:style>
+      <a:lnRef idx="2">
+        <a:scrgbClr r="0" g="0" b="0"/>
+      </a:lnRef>
+      <a:fillRef idx="1">
+        <a:scrgbClr r="0" g="0" b="0"/>
+      </a:fillRef>
+      <a:effectRef idx="0">
+        <a:scrgbClr r="0" g="0" b="0"/>
+      </a:effectRef>
+      <a:fontRef idx="minor">
+        <a:schemeClr val="tx1"/>
+      </a:fontRef>
+    </dgm:style>
+  </dgm:styleLbl>
+  <dgm:styleLbl name="alignNode1">
+    <dgm:scene3d>
+      <a:camera prst="orthographicFront"/>
+      <a:lightRig rig="threePt" dir="t"/>
+    </dgm:scene3d>
+    <dgm:sp3d/>
+    <dgm:txPr/>
+    <dgm:style>
+      <a:lnRef idx="2">
+        <a:scrgbClr r="0" g="0" b="0"/>
+      </a:lnRef>
+      <a:fillRef idx="1">
+        <a:scrgbClr r="0" g="0" b="0"/>
+      </a:fillRef>
+      <a:effectRef idx="0">
+        <a:scrgbClr r="0" g="0" b="0"/>
+      </a:effectRef>
+      <a:fontRef idx="minor">
+        <a:schemeClr val="lt1"/>
+      </a:fontRef>
+    </dgm:style>
+  </dgm:styleLbl>
+  <dgm:styleLbl name="node1">
+    <dgm:scene3d>
+      <a:camera prst="orthographicFront"/>
+      <a:lightRig rig="threePt" dir="t"/>
+    </dgm:scene3d>
+    <dgm:sp3d/>
+    <dgm:txPr/>
+    <dgm:style>
+      <a:lnRef idx="2">
+        <a:scrgbClr r="0" g="0" b="0"/>
+      </a:lnRef>
+      <a:fillRef idx="1">
+        <a:scrgbClr r="0" g="0" b="0"/>
+      </a:fillRef>
+      <a:effectRef idx="0">
+        <a:scrgbClr r="0" g="0" b="0"/>
+      </a:effectRef>
+      <a:fontRef idx="minor">
+        <a:schemeClr val="lt1"/>
+      </a:fontRef>
+    </dgm:style>
+  </dgm:styleLbl>
+  <dgm:styleLbl name="node2">
+    <dgm:scene3d>
+      <a:camera prst="orthographicFront"/>
+      <a:lightRig rig="threePt" dir="t"/>
+    </dgm:scene3d>
+    <dgm:sp3d/>
+    <dgm:txPr/>
+    <dgm:style>
+      <a:lnRef idx="2">
+        <a:scrgbClr r="0" g="0" b="0"/>
+      </a:lnRef>
+      <a:fillRef idx="1">
+        <a:scrgbClr r="0" g="0" b="0"/>
+      </a:fillRef>
+      <a:effectRef idx="0">
+        <a:scrgbClr r="0" g="0" b="0"/>
+      </a:effectRef>
+      <a:fontRef idx="minor">
+        <a:schemeClr val="lt1"/>
+      </a:fontRef>
+    </dgm:style>
+  </dgm:styleLbl>
+  <dgm:styleLbl name="node3">
+    <dgm:scene3d>
+      <a:camera prst="orthographicFront"/>
+      <a:lightRig rig="threePt" dir="t"/>
+    </dgm:scene3d>
+    <dgm:sp3d/>
+    <dgm:txPr/>
+    <dgm:style>
+      <a:lnRef idx="2">
+        <a:scrgbClr r="0" g="0" b="0"/>
+      </a:lnRef>
+      <a:fillRef idx="1">
+        <a:scrgbClr r="0" g="0" b="0"/>
+      </a:fillRef>
+      <a:effectRef idx="0">
+        <a:scrgbClr r="0" g="0" b="0"/>
+      </a:effectRef>
+      <a:fontRef idx="minor">
+        <a:schemeClr val="lt1"/>
+      </a:fontRef>
+    </dgm:style>
+  </dgm:styleLbl>
+  <dgm:styleLbl name="node4">
+    <dgm:scene3d>
+      <a:camera prst="orthographicFront"/>
+      <a:lightRig rig="threePt" dir="t"/>
+    </dgm:scene3d>
+    <dgm:sp3d/>
+    <dgm:txPr/>
+    <dgm:style>
+      <a:lnRef idx="2">
+        <a:scrgbClr r="0" g="0" b="0"/>
+      </a:lnRef>
+      <a:fillRef idx="1">
+        <a:scrgbClr r="0" g="0" b="0"/>
+      </a:fillRef>
+      <a:effectRef idx="0">
+        <a:scrgbClr r="0" g="0" b="0"/>
+      </a:effectRef>
+      <a:fontRef idx="minor">
+        <a:schemeClr val="lt1"/>
+      </a:fontRef>
+    </dgm:style>
+  </dgm:styleLbl>
+  <dgm:styleLbl name="fgImgPlace1">
+    <dgm:scene3d>
+      <a:camera prst="orthographicFront"/>
+      <a:lightRig rig="threePt" dir="t"/>
+    </dgm:scene3d>
+    <dgm:sp3d/>
+    <dgm:txPr/>
+    <dgm:style>
+      <a:lnRef idx="2">
+        <a:scrgbClr r="0" g="0" b="0"/>
+      </a:lnRef>
+      <a:fillRef idx="1">
+        <a:scrgbClr r="0" g="0" b="0"/>
+      </a:fillRef>
+      <a:effectRef idx="0">
+        <a:scrgbClr r="0" g="0" b="0"/>
+      </a:effectRef>
+      <a:fontRef idx="minor"/>
+    </dgm:style>
+  </dgm:styleLbl>
+  <dgm:styleLbl name="alignImgPlace1">
+    <dgm:scene3d>
+      <a:camera prst="orthographicFront"/>
+      <a:lightRig rig="threePt" dir="t"/>
+    </dgm:scene3d>
+    <dgm:sp3d/>
+    <dgm:txPr/>
+    <dgm:style>
+      <a:lnRef idx="2">
+        <a:scrgbClr r="0" g="0" b="0"/>
+      </a:lnRef>
+      <a:fillRef idx="1">
+        <a:scrgbClr r="0" g="0" b="0"/>
+      </a:fillRef>
+      <a:effectRef idx="0">
+        <a:scrgbClr r="0" g="0" b="0"/>
+      </a:effectRef>
+      <a:fontRef idx="minor"/>
+    </dgm:style>
+  </dgm:styleLbl>
+  <dgm:styleLbl name="bgImgPlace1">
+    <dgm:scene3d>
+      <a:camera prst="orthographicFront"/>
+      <a:lightRig rig="threePt" dir="t"/>
+    </dgm:scene3d>
+    <dgm:sp3d/>
+    <dgm:txPr/>
+    <dgm:style>
+      <a:lnRef idx="2">
+        <a:scrgbClr r="0" g="0" b="0"/>
+      </a:lnRef>
+      <a:fillRef idx="1">
+        <a:scrgbClr r="0" g="0" b="0"/>
+      </a:fillRef>
+      <a:effectRef idx="0">
+        <a:scrgbClr r="0" g="0" b="0"/>
+      </a:effectRef>
+      <a:fontRef idx="minor"/>
+    </dgm:style>
+  </dgm:styleLbl>
+  <dgm:styleLbl name="sibTrans2D1">
+    <dgm:scene3d>
+      <a:camera prst="orthographicFront"/>
+      <a:lightRig rig="threePt" dir="t"/>
+    </dgm:scene3d>
+    <dgm:sp3d/>
+    <dgm:txPr/>
+    <dgm:style>
+      <a:lnRef idx="0">
+        <a:scrgbClr r="0" g="0" b="0"/>
+      </a:lnRef>
+      <a:fillRef idx="1">
+        <a:scrgbClr r="0" g="0" b="0"/>
+      </a:fillRef>
+      <a:effectRef idx="0">
+        <a:scrgbClr r="0" g="0" b="0"/>
+      </a:effectRef>
+      <a:fontRef idx="minor">
+        <a:schemeClr val="lt1"/>
+      </a:fontRef>
+    </dgm:style>
+  </dgm:styleLbl>
+  <dgm:styleLbl name="fgSibTrans2D1">
+    <dgm:scene3d>
+      <a:camera prst="orthographicFront"/>
+      <a:lightRig rig="threePt" dir="t"/>
+    </dgm:scene3d>
+    <dgm:sp3d/>
+    <dgm:txPr/>
+    <dgm:style>
+      <a:lnRef idx="0">
+        <a:scrgbClr r="0" g="0" b="0"/>
+      </a:lnRef>
+      <a:fillRef idx="1">
+        <a:scrgbClr r="0" g="0" b="0"/>
+      </a:fillRef>
+      <a:effectRef idx="0">
+        <a:scrgbClr r="0" g="0" b="0"/>
+      </a:effectRef>
+      <a:fontRef idx="minor">
+        <a:schemeClr val="lt1"/>
+      </a:fontRef>
+    </dgm:style>
+  </dgm:styleLbl>
+  <dgm:styleLbl name="bgSibTrans2D1">
+    <dgm:scene3d>
+      <a:camera prst="orthographicFront"/>
+      <a:lightRig rig="threePt" dir="t"/>
+    </dgm:scene3d>
+    <dgm:sp3d/>
+    <dgm:txPr/>
+    <dgm:style>
+      <a:lnRef idx="0">
+        <a:scrgbClr r="0" g="0" b="0"/>
+      </a:lnRef>
+      <a:fillRef idx="1">
+        <a:scrgbClr r="0" g="0" b="0"/>
+      </a:fillRef>
+      <a:effectRef idx="0">
+        <a:scrgbClr r="0" g="0" b="0"/>
+      </a:effectRef>
+      <a:fontRef idx="minor">
+        <a:schemeClr val="lt1"/>
+      </a:fontRef>
+    </dgm:style>
+  </dgm:styleLbl>
+  <dgm:styleLbl name="sibTrans1D1">
+    <dgm:scene3d>
+      <a:camera prst="orthographicFront"/>
+      <a:lightRig rig="threePt" dir="t"/>
+    </dgm:scene3d>
+    <dgm:sp3d/>
+    <dgm:txPr/>
+    <dgm:style>
+      <a:lnRef idx="1">
+        <a:scrgbClr r="0" g="0" b="0"/>
+      </a:lnRef>
+      <a:fillRef idx="0">
+        <a:scrgbClr r="0" g="0" b="0"/>
+      </a:fillRef>
+      <a:effectRef idx="0">
+        <a:scrgbClr r="0" g="0" b="0"/>
+      </a:effectRef>
+      <a:fontRef idx="minor"/>
+    </dgm:style>
+  </dgm:styleLbl>
+  <dgm:styleLbl name="callout">
+    <dgm:scene3d>
+      <a:camera prst="orthographicFront"/>
+      <a:lightRig rig="threePt" dir="t"/>
+    </dgm:scene3d>
+    <dgm:sp3d/>
+    <dgm:txPr/>
+    <dgm:style>
+      <a:lnRef idx="2">
+        <a:scrgbClr r="0" g="0" b="0"/>
+      </a:lnRef>
+      <a:fillRef idx="1">
+        <a:scrgbClr r="0" g="0" b="0"/>
+      </a:fillRef>
+      <a:effectRef idx="0">
+        <a:scrgbClr r="0" g="0" b="0"/>
+      </a:effectRef>
+      <a:fontRef idx="minor"/>
+    </dgm:style>
+  </dgm:styleLbl>
+  <dgm:styleLbl name="asst0">
+    <dgm:scene3d>
+      <a:camera prst="orthographicFront"/>
+      <a:lightRig rig="threePt" dir="t"/>
+    </dgm:scene3d>
+    <dgm:sp3d/>
+    <dgm:txPr/>
+    <dgm:style>
+      <a:lnRef idx="2">
+        <a:scrgbClr r="0" g="0" b="0"/>
+      </a:lnRef>
+      <a:fillRef idx="1">
+        <a:scrgbClr r="0" g="0" b="0"/>
+      </a:fillRef>
+      <a:effectRef idx="0">
+        <a:scrgbClr r="0" g="0" b="0"/>
+      </a:effectRef>
+      <a:fontRef idx="minor">
+        <a:schemeClr val="lt1"/>
+      </a:fontRef>
+    </dgm:style>
+  </dgm:styleLbl>
+  <dgm:styleLbl name="asst1">
+    <dgm:scene3d>
+      <a:camera prst="orthographicFront"/>
+      <a:lightRig rig="threePt" dir="t"/>
+    </dgm:scene3d>
+    <dgm:sp3d/>
+    <dgm:txPr/>
+    <dgm:style>
+      <a:lnRef idx="2">
+        <a:scrgbClr r="0" g="0" b="0"/>
+      </a:lnRef>
+      <a:fillRef idx="1">
+        <a:scrgbClr r="0" g="0" b="0"/>
+      </a:fillRef>
+      <a:effectRef idx="0">
+        <a:scrgbClr r="0" g="0" b="0"/>
+      </a:effectRef>
+      <a:fontRef idx="minor">
+        <a:schemeClr val="lt1"/>
+      </a:fontRef>
+    </dgm:style>
+  </dgm:styleLbl>
+  <dgm:styleLbl name="asst2">
+    <dgm:scene3d>
+      <a:camera prst="orthographicFront"/>
+      <a:lightRig rig="threePt" dir="t"/>
+    </dgm:scene3d>
+    <dgm:sp3d/>
+    <dgm:txPr/>
+    <dgm:style>
+      <a:lnRef idx="2">
+        <a:scrgbClr r="0" g="0" b="0"/>
+      </a:lnRef>
+      <a:fillRef idx="1">
+        <a:scrgbClr r="0" g="0" b="0"/>
+      </a:fillRef>
+      <a:effectRef idx="0">
+        <a:scrgbClr r="0" g="0" b="0"/>
+      </a:effectRef>
+      <a:fontRef idx="minor">
+        <a:schemeClr val="lt1"/>
+      </a:fontRef>
+    </dgm:style>
+  </dgm:styleLbl>
+  <dgm:styleLbl name="asst3">
+    <dgm:scene3d>
+      <a:camera prst="orthographicFront"/>
+      <a:lightRig rig="threePt" dir="t"/>
+    </dgm:scene3d>
+    <dgm:sp3d/>
+    <dgm:txPr/>
+    <dgm:style>
+      <a:lnRef idx="2">
+        <a:scrgbClr r="0" g="0" b="0"/>
+      </a:lnRef>
+      <a:fillRef idx="1">
+        <a:scrgbClr r="0" g="0" b="0"/>
+      </a:fillRef>
+      <a:effectRef idx="0">
+        <a:scrgbClr r="0" g="0" b="0"/>
+      </a:effectRef>
+      <a:fontRef idx="minor">
+        <a:schemeClr val="lt1"/>
+      </a:fontRef>
+    </dgm:style>
+  </dgm:styleLbl>
+  <dgm:styleLbl name="asst4">
+    <dgm:scene3d>
+      <a:camera prst="orthographicFront"/>
+      <a:lightRig rig="threePt" dir="t"/>
+    </dgm:scene3d>
+    <dgm:sp3d/>
+    <dgm:txPr/>
+    <dgm:style>
+      <a:lnRef idx="2">
+        <a:scrgbClr r="0" g="0" b="0"/>
+      </a:lnRef>
+      <a:fillRef idx="1">
+        <a:scrgbClr r="0" g="0" b="0"/>
+      </a:fillRef>
+      <a:effectRef idx="0">
+        <a:scrgbClr r="0" g="0" b="0"/>
+      </a:effectRef>
+      <a:fontRef idx="minor">
+        <a:schemeClr val="lt1"/>
+      </a:fontRef>
+    </dgm:style>
+  </dgm:styleLbl>
+  <dgm:styleLbl name="parChTrans2D1">
+    <dgm:scene3d>
+      <a:camera prst="orthographicFront"/>
+      <a:lightRig rig="threePt" dir="t"/>
+    </dgm:scene3d>
+    <dgm:sp3d/>
+    <dgm:txPr/>
+    <dgm:style>
+      <a:lnRef idx="2">
+        <a:scrgbClr r="0" g="0" b="0"/>
+      </a:lnRef>
+      <a:fillRef idx="1">
+        <a:scrgbClr r="0" g="0" b="0"/>
+      </a:fillRef>
+      <a:effectRef idx="0">
+        <a:scrgbClr r="0" g="0" b="0"/>
+      </a:effectRef>
+      <a:fontRef idx="minor">
+        <a:schemeClr val="lt1"/>
+      </a:fontRef>
+    </dgm:style>
+  </dgm:styleLbl>
+  <dgm:styleLbl name="parChTrans2D2">
+    <dgm:scene3d>
+      <a:camera prst="orthographicFront"/>
+      <a:lightRig rig="threePt" dir="t"/>
+    </dgm:scene3d>
+    <dgm:sp3d/>
+    <dgm:txPr/>
+    <dgm:style>
+      <a:lnRef idx="2">
+        <a:scrgbClr r="0" g="0" b="0"/>
+      </a:lnRef>
+      <a:fillRef idx="1">
+        <a:scrgbClr r="0" g="0" b="0"/>
+      </a:fillRef>
+      <a:effectRef idx="0">
+        <a:scrgbClr r="0" g="0" b="0"/>
+      </a:effectRef>
+      <a:fontRef idx="minor">
+        <a:schemeClr val="lt1"/>
+      </a:fontRef>
+    </dgm:style>
+  </dgm:styleLbl>
+  <dgm:styleLbl name="parChTrans2D3">
+    <dgm:scene3d>
+      <a:camera prst="orthographicFront"/>
+      <a:lightRig rig="threePt" dir="t"/>
+    </dgm:scene3d>
+    <dgm:sp3d/>
+    <dgm:txPr/>
+    <dgm:style>
+      <a:lnRef idx="2">
+        <a:scrgbClr r="0" g="0" b="0"/>
+      </a:lnRef>
+      <a:fillRef idx="1">
+        <a:scrgbClr r="0" g="0" b="0"/>
+      </a:fillRef>
+      <a:effectRef idx="0">
+        <a:scrgbClr r="0" g="0" b="0"/>
+      </a:effectRef>
+      <a:fontRef idx="minor">
+        <a:schemeClr val="lt1"/>
+      </a:fontRef>
+    </dgm:style>
+  </dgm:styleLbl>
+  <dgm:styleLbl name="parChTrans2D4">
+    <dgm:scene3d>
+      <a:camera prst="orthographicFront"/>
+      <a:lightRig rig="threePt" dir="t"/>
+    </dgm:scene3d>
+    <dgm:sp3d/>
+    <dgm:txPr/>
+    <dgm:style>
+      <a:lnRef idx="2">
+        <a:scrgbClr r="0" g="0" b="0"/>
+      </a:lnRef>
+      <a:fillRef idx="1">
+        <a:scrgbClr r="0" g="0" b="0"/>
+      </a:fillRef>
+      <a:effectRef idx="0">
+        <a:scrgbClr r="0" g="0" b="0"/>
+      </a:effectRef>
+      <a:fontRef idx="minor">
+        <a:schemeClr val="lt1"/>
+      </a:fontRef>
+    </dgm:style>
+  </dgm:styleLbl>
+  <dgm:styleLbl name="parChTrans1D1">
+    <dgm:scene3d>
+      <a:camera prst="orthographicFront"/>
+      <a:lightRig rig="threePt" dir="t"/>
+    </dgm:scene3d>
+    <dgm:sp3d/>
+    <dgm:txPr/>
+    <dgm:style>
+      <a:lnRef idx="2">
+        <a:scrgbClr r="0" g="0" b="0"/>
+      </a:lnRef>
+      <a:fillRef idx="0">
+        <a:scrgbClr r="0" g="0" b="0"/>
+      </a:fillRef>
+      <a:effectRef idx="0">
+        <a:scrgbClr r="0" g="0" b="0"/>
+      </a:effectRef>
+      <a:fontRef idx="minor"/>
+    </dgm:style>
+  </dgm:styleLbl>
+  <dgm:styleLbl name="parChTrans1D2">
+    <dgm:scene3d>
+      <a:camera prst="orthographicFront"/>
+      <a:lightRig rig="threePt" dir="t"/>
+    </dgm:scene3d>
+    <dgm:sp3d/>
+    <dgm:txPr/>
+    <dgm:style>
+      <a:lnRef idx="2">
+        <a:scrgbClr r="0" g="0" b="0"/>
+      </a:lnRef>
+      <a:fillRef idx="0">
+        <a:scrgbClr r="0" g="0" b="0"/>
+      </a:fillRef>
+      <a:effectRef idx="0">
+        <a:scrgbClr r="0" g="0" b="0"/>
+      </a:effectRef>
+      <a:fontRef idx="minor"/>
+    </dgm:style>
+  </dgm:styleLbl>
+  <dgm:styleLbl name="parChTrans1D3">
+    <dgm:scene3d>
+      <a:camera prst="orthographicFront"/>
+      <a:lightRig rig="threePt" dir="t"/>
+    </dgm:scene3d>
+    <dgm:sp3d/>
+    <dgm:txPr/>
+    <dgm:style>
+      <a:lnRef idx="2">
+        <a:scrgbClr r="0" g="0" b="0"/>
+      </a:lnRef>
+      <a:fillRef idx="0">
+        <a:scrgbClr r="0" g="0" b="0"/>
+      </a:fillRef>
+      <a:effectRef idx="0">
+        <a:scrgbClr r="0" g="0" b="0"/>
+      </a:effectRef>
+      <a:fontRef idx="minor"/>
+    </dgm:style>
+  </dgm:styleLbl>
+  <dgm:styleLbl name="parChTrans1D4">
+    <dgm:scene3d>
+      <a:camera prst="orthographicFront"/>
+      <a:lightRig rig="threePt" dir="t"/>
+    </dgm:scene3d>
+    <dgm:sp3d/>
+    <dgm:txPr/>
+    <dgm:style>
+      <a:lnRef idx="2">
+        <a:scrgbClr r="0" g="0" b="0"/>
+      </a:lnRef>
+      <a:fillRef idx="0">
+        <a:scrgbClr r="0" g="0" b="0"/>
+      </a:fillRef>
+      <a:effectRef idx="0">
+        <a:scrgbClr r="0" g="0" b="0"/>
+      </a:effectRef>
+      <a:fontRef idx="minor"/>
+    </dgm:style>
+  </dgm:styleLbl>
+  <dgm:styleLbl name="fgAcc1">
+    <dgm:scene3d>
+      <a:camera prst="orthographicFront"/>
+      <a:lightRig rig="threePt" dir="t"/>
+    </dgm:scene3d>
+    <dgm:sp3d/>
+    <dgm:txPr/>
+    <dgm:style>
+      <a:lnRef idx="2">
+        <a:scrgbClr r="0" g="0" b="0"/>
+      </a:lnRef>
+      <a:fillRef idx="1">
+        <a:scrgbClr r="0" g="0" b="0"/>
+      </a:fillRef>
+      <a:effectRef idx="0">
+        <a:scrgbClr r="0" g="0" b="0"/>
+      </a:effectRef>
+      <a:fontRef idx="minor"/>
+    </dgm:style>
+  </dgm:styleLbl>
+  <dgm:styleLbl name="conFgAcc1">
+    <dgm:scene3d>
+      <a:camera prst="orthographicFront"/>
+      <a:lightRig rig="threePt" dir="t"/>
+    </dgm:scene3d>
+    <dgm:sp3d/>
+    <dgm:txPr/>
+    <dgm:style>
+      <a:lnRef idx="2">
+        <a:scrgbClr r="0" g="0" b="0"/>
+      </a:lnRef>
+      <a:fillRef idx="1">
+        <a:scrgbClr r="0" g="0" b="0"/>
+      </a:fillRef>
+      <a:effectRef idx="0">
+        <a:scrgbClr r="0" g="0" b="0"/>
+      </a:effectRef>
+      <a:fontRef idx="minor"/>
+    </dgm:style>
+  </dgm:styleLbl>
+  <dgm:styleLbl name="alignAcc1">
+    <dgm:scene3d>
+      <a:camera prst="orthographicFront"/>
+      <a:lightRig rig="threePt" dir="t"/>
+    </dgm:scene3d>
+    <dgm:sp3d/>
+    <dgm:txPr/>
+    <dgm:style>
+      <a:lnRef idx="2">
+        <a:scrgbClr r="0" g="0" b="0"/>
+      </a:lnRef>
+      <a:fillRef idx="1">
+        <a:scrgbClr r="0" g="0" b="0"/>
+      </a:fillRef>
+      <a:effectRef idx="0">
+        <a:scrgbClr r="0" g="0" b="0"/>
+      </a:effectRef>
+      <a:fontRef idx="minor"/>
+    </dgm:style>
+  </dgm:styleLbl>
+  <dgm:styleLbl name="trAlignAcc1">
+    <dgm:scene3d>
+      <a:camera prst="orthographicFront"/>
+      <a:lightRig rig="threePt" dir="t"/>
+    </dgm:scene3d>
+    <dgm:sp3d/>
+    <dgm:txPr/>
+    <dgm:style>
+      <a:lnRef idx="1">
+        <a:scrgbClr r="0" g="0" b="0"/>
+      </a:lnRef>
+      <a:fillRef idx="1">
+        <a:scrgbClr r="0" g="0" b="0"/>
+      </a:fillRef>
+      <a:effectRef idx="0">
+        <a:scrgbClr r="0" g="0" b="0"/>
+      </a:effectRef>
+      <a:fontRef idx="minor"/>
+    </dgm:style>
+  </dgm:styleLbl>
+  <dgm:styleLbl name="bgAcc1">
+    <dgm:scene3d>
+      <a:camera prst="orthographicFront"/>
+      <a:lightRig rig="threePt" dir="t"/>
+    </dgm:scene3d>
+    <dgm:sp3d/>
+    <dgm:txPr/>
+    <dgm:style>
+      <a:lnRef idx="2">
+        <a:scrgbClr r="0" g="0" b="0"/>
+      </a:lnRef>
+      <a:fillRef idx="1">
+        <a:scrgbClr r="0" g="0" b="0"/>
+      </a:fillRef>
+      <a:effectRef idx="0">
+        <a:scrgbClr r="0" g="0" b="0"/>
+      </a:effectRef>
+      <a:fontRef idx="minor"/>
+    </dgm:style>
+  </dgm:styleLbl>
+  <dgm:styleLbl name="solidFgAcc1">
+    <dgm:scene3d>
+      <a:camera prst="orthographicFront"/>
+      <a:lightRig rig="threePt" dir="t"/>
+    </dgm:scene3d>
+    <dgm:sp3d/>
+    <dgm:txPr/>
+    <dgm:style>
+      <a:lnRef idx="2">
+        <a:scrgbClr r="0" g="0" b="0"/>
+      </a:lnRef>
+      <a:fillRef idx="1">
+        <a:scrgbClr r="0" g="0" b="0"/>
+      </a:fillRef>
+      <a:effectRef idx="0">
+        <a:scrgbClr r="0" g="0" b="0"/>
+      </a:effectRef>
+      <a:fontRef idx="minor"/>
+    </dgm:style>
+  </dgm:styleLbl>
+  <dgm:styleLbl name="solidAlignAcc1">
+    <dgm:scene3d>
+      <a:camera prst="orthographicFront"/>
+      <a:lightRig rig="threePt" dir="t"/>
+    </dgm:scene3d>
+    <dgm:sp3d/>
+    <dgm:txPr/>
+    <dgm:style>
+      <a:lnRef idx="2">
+        <a:scrgbClr r="0" g="0" b="0"/>
+      </a:lnRef>
+      <a:fillRef idx="1">
+        <a:scrgbClr r="0" g="0" b="0"/>
+      </a:fillRef>
+      <a:effectRef idx="0">
+        <a:scrgbClr r="0" g="0" b="0"/>
+      </a:effectRef>
+      <a:fontRef idx="minor"/>
+    </dgm:style>
+  </dgm:styleLbl>
+  <dgm:styleLbl name="solidBgAcc1">
+    <dgm:scene3d>
+      <a:camera prst="orthographicFront"/>
+      <a:lightRig rig="threePt" dir="t"/>
+    </dgm:scene3d>
+    <dgm:sp3d/>
+    <dgm:txPr/>
+    <dgm:style>
+      <a:lnRef idx="2">
+        <a:scrgbClr r="0" g="0" b="0"/>
+      </a:lnRef>
+      <a:fillRef idx="1">
+        <a:scrgbClr r="0" g="0" b="0"/>
+      </a:fillRef>
+      <a:effectRef idx="0">
+        <a:scrgbClr r="0" g="0" b="0"/>
+      </a:effectRef>
+      <a:fontRef idx="minor"/>
+    </dgm:style>
+  </dgm:styleLbl>
+  <dgm:styleLbl name="fgAccFollowNode1">
+    <dgm:scene3d>
+      <a:camera prst="orthographicFront"/>
+      <a:lightRig rig="threePt" dir="t"/>
+    </dgm:scene3d>
+    <dgm:sp3d/>
+    <dgm:txPr/>
+    <dgm:style>
+      <a:lnRef idx="2">
+        <a:scrgbClr r="0" g="0" b="0"/>
+      </a:lnRef>
+      <a:fillRef idx="1">
+        <a:scrgbClr r="0" g="0" b="0"/>
+      </a:fillRef>
+      <a:effectRef idx="0">
+        <a:scrgbClr r="0" g="0" b="0"/>
+      </a:effectRef>
+      <a:fontRef idx="minor"/>
+    </dgm:style>
+  </dgm:styleLbl>
+  <dgm:styleLbl name="alignAccFollowNode1">
+    <dgm:scene3d>
+      <a:camera prst="orthographicFront"/>
+      <a:lightRig rig="threePt" dir="t"/>
+    </dgm:scene3d>
+    <dgm:sp3d/>
+    <dgm:txPr/>
+    <dgm:style>
+      <a:lnRef idx="2">
+        <a:scrgbClr r="0" g="0" b="0"/>
+      </a:lnRef>
+      <a:fillRef idx="1">
+        <a:scrgbClr r="0" g="0" b="0"/>
+      </a:fillRef>
+      <a:effectRef idx="0">
+        <a:scrgbClr r="0" g="0" b="0"/>
+      </a:effectRef>
+      <a:fontRef idx="minor"/>
+    </dgm:style>
+  </dgm:styleLbl>
+  <dgm:styleLbl name="bgAccFollowNode1">
+    <dgm:scene3d>
+      <a:camera prst="orthographicFront"/>
+      <a:lightRig rig="threePt" dir="t"/>
+    </dgm:scene3d>
+    <dgm:sp3d/>
+    <dgm:txPr/>
+    <dgm:style>
+      <a:lnRef idx="2">
+        <a:scrgbClr r="0" g="0" b="0"/>
+      </a:lnRef>
+      <a:fillRef idx="1">
+        <a:scrgbClr r="0" g="0" b="0"/>
+      </a:fillRef>
+      <a:effectRef idx="0">
+        <a:scrgbClr r="0" g="0" b="0"/>
+      </a:effectRef>
+      <a:fontRef idx="minor"/>
+    </dgm:style>
+  </dgm:styleLbl>
+  <dgm:styleLbl name="fgAcc0">
+    <dgm:scene3d>
+      <a:camera prst="orthographicFront"/>
+      <a:lightRig rig="threePt" dir="t"/>
+    </dgm:scene3d>
+    <dgm:sp3d/>
+    <dgm:txPr/>
+    <dgm:style>
+      <a:lnRef idx="2">
+        <a:scrgbClr r="0" g="0" b="0"/>
+      </a:lnRef>
+      <a:fillRef idx="1">
+        <a:scrgbClr r="0" g="0" b="0"/>
+      </a:fillRef>
+      <a:effectRef idx="0">
+        <a:scrgbClr r="0" g="0" b="0"/>
+      </a:effectRef>
+      <a:fontRef idx="minor"/>
+    </dgm:style>
+  </dgm:styleLbl>
+  <dgm:styleLbl name="fgAcc2">
+    <dgm:scene3d>
+      <a:camera prst="orthographicFront"/>
+      <a:lightRig rig="threePt" dir="t"/>
+    </dgm:scene3d>
+    <dgm:sp3d/>
+    <dgm:txPr/>
+    <dgm:style>
+      <a:lnRef idx="2">
+        <a:scrgbClr r="0" g="0" b="0"/>
+      </a:lnRef>
+      <a:fillRef idx="1">
+        <a:scrgbClr r="0" g="0" b="0"/>
+      </a:fillRef>
+      <a:effectRef idx="0">
+        <a:scrgbClr r="0" g="0" b="0"/>
+      </a:effectRef>
+      <a:fontRef idx="minor"/>
+    </dgm:style>
+  </dgm:styleLbl>
+  <dgm:styleLbl name="fgAcc3">
+    <dgm:scene3d>
+      <a:camera prst="orthographicFront"/>
+      <a:lightRig rig="threePt" dir="t"/>
+    </dgm:scene3d>
+    <dgm:sp3d/>
+    <dgm:txPr/>
+    <dgm:style>
+      <a:lnRef idx="2">
+        <a:scrgbClr r="0" g="0" b="0"/>
+      </a:lnRef>
+      <a:fillRef idx="1">
+        <a:scrgbClr r="0" g="0" b="0"/>
+      </a:fillRef>
+      <a:effectRef idx="0">
+        <a:scrgbClr r="0" g="0" b="0"/>
+      </a:effectRef>
+      <a:fontRef idx="minor"/>
+    </dgm:style>
+  </dgm:styleLbl>
+  <dgm:styleLbl name="fgAcc4">
+    <dgm:scene3d>
+      <a:camera prst="orthographicFront"/>
+      <a:lightRig rig="threePt" dir="t"/>
+    </dgm:scene3d>
+    <dgm:sp3d/>
+    <dgm:txPr/>
+    <dgm:style>
+      <a:lnRef idx="2">
+        <a:scrgbClr r="0" g="0" b="0"/>
+      </a:lnRef>
+      <a:fillRef idx="1">
+        <a:scrgbClr r="0" g="0" b="0"/>
+      </a:fillRef>
+      <a:effectRef idx="0">
+        <a:scrgbClr r="0" g="0" b="0"/>
+      </a:effectRef>
+      <a:fontRef idx="minor"/>
+    </dgm:style>
+  </dgm:styleLbl>
+  <dgm:styleLbl name="bgShp">
+    <dgm:scene3d>
+      <a:camera prst="orthographicFront"/>
+      <a:lightRig rig="threePt" dir="t"/>
+    </dgm:scene3d>
+    <dgm:sp3d/>
+    <dgm:txPr/>
+    <dgm:style>
+      <a:lnRef idx="0">
+        <a:scrgbClr r="0" g="0" b="0"/>
+      </a:lnRef>
+      <a:fillRef idx="1">
+        <a:scrgbClr r="0" g="0" b="0"/>
+      </a:fillRef>
+      <a:effectRef idx="0">
+        <a:scrgbClr r="0" g="0" b="0"/>
+      </a:effectRef>
+      <a:fontRef idx="minor"/>
+    </dgm:style>
+  </dgm:styleLbl>
+  <dgm:styleLbl name="dkBgShp">
+    <dgm:scene3d>
+      <a:camera prst="orthographicFront"/>
+      <a:lightRig rig="threePt" dir="t"/>
+    </dgm:scene3d>
+    <dgm:sp3d/>
+    <dgm:txPr/>
+    <dgm:style>
+      <a:lnRef idx="0">
+        <a:scrgbClr r="0" g="0" b="0"/>
+      </a:lnRef>
+      <a:fillRef idx="1">
+        <a:scrgbClr r="0" g="0" b="0"/>
+      </a:fillRef>
+      <a:effectRef idx="0">
+        <a:scrgbClr r="0" g="0" b="0"/>
+      </a:effectRef>
+      <a:fontRef idx="minor"/>
+    </dgm:style>
+  </dgm:styleLbl>
+  <dgm:styleLbl name="trBgShp">
+    <dgm:scene3d>
+      <a:camera prst="orthographicFront"/>
+      <a:lightRig rig="threePt" dir="t"/>
+    </dgm:scene3d>
+    <dgm:sp3d/>
+    <dgm:txPr/>
+    <dgm:style>
+      <a:lnRef idx="0">
+        <a:scrgbClr r="0" g="0" b="0"/>
+      </a:lnRef>
+      <a:fillRef idx="1">
+        <a:scrgbClr r="0" g="0" b="0"/>
+      </a:fillRef>
+      <a:effectRef idx="0">
+        <a:scrgbClr r="0" g="0" b="0"/>
+      </a:effectRef>
+      <a:fontRef idx="minor"/>
+    </dgm:style>
+  </dgm:styleLbl>
+  <dgm:styleLbl name="fgShp">
+    <dgm:scene3d>
+      <a:camera prst="orthographicFront"/>
+      <a:lightRig rig="threePt" dir="t"/>
+    </dgm:scene3d>
+    <dgm:sp3d/>
+    <dgm:txPr/>
+    <dgm:style>
+      <a:lnRef idx="2">
+        <a:scrgbClr r="0" g="0" b="0"/>
+      </a:lnRef>
+      <a:fillRef idx="1">
+        <a:scrgbClr r="0" g="0" b="0"/>
+      </a:fillRef>
+      <a:effectRef idx="0">
+        <a:scrgbClr r="0" g="0" b="0"/>
+      </a:effectRef>
+      <a:fontRef idx="minor"/>
+    </dgm:style>
+  </dgm:styleLbl>
+  <dgm:styleLbl name="revTx">
+    <dgm:scene3d>
+      <a:camera prst="orthographicFront"/>
+      <a:lightRig rig="threePt" dir="t"/>
+    </dgm:scene3d>
+    <dgm:sp3d/>
+    <dgm:txPr/>
+    <dgm:style>
+      <a:lnRef idx="0">
+        <a:scrgbClr r="0" g="0" b="0"/>
+      </a:lnRef>
+      <a:fillRef idx="0">
+        <a:scrgbClr r="0" g="0" b="0"/>
+      </a:fillRef>
+      <a:effectRef idx="0">
+        <a:scrgbClr r="0" g="0" b="0"/>
+      </a:effectRef>
+      <a:fontRef idx="minor"/>
+    </dgm:style>
+  </dgm:styleLbl>
+</dgm:styleDef>
 </file>
 
 <file path=ppt/ink/ink1.xml><?xml version="1.0" encoding="utf-8"?>
@@ -6646,7 +9057,12 @@
             <p:ph type="title"/>
           </p:nvPr>
         </p:nvSpPr>
-        <p:spPr/>
+        <p:spPr>
+          <a:xfrm>
+            <a:off x="733080" y="243939"/>
+            <a:ext cx="10515600" cy="1325563"/>
+          </a:xfrm>
+        </p:spPr>
         <p:txBody>
           <a:bodyPr/>
           <a:lstStyle/>
@@ -6676,8 +9092,8 @@
         </p:nvSpPr>
         <p:spPr>
           <a:xfrm>
-            <a:off x="830855" y="1399142"/>
-            <a:ext cx="10515600" cy="4990641"/>
+            <a:off x="627961" y="1270880"/>
+            <a:ext cx="10725839" cy="5221995"/>
           </a:xfrm>
         </p:spPr>
         <p:txBody>
@@ -6768,7 +9184,7 @@
             </a:pPr>
             <a:r>
               <a:rPr lang="en-US"/>
-              <a:t>In modern meritocratic societies, genes affect SES. </a:t>
+              <a:t>In modern meritocracies, genes affect SES. </a:t>
             </a:r>
           </a:p>
           <a:p>
@@ -6778,7 +9194,7 @@
             </a:pPr>
             <a:r>
               <a:rPr lang="en-US"/>
-              <a:t>Under socio-genetic assortative mating, in all societies, SES can affect genes.</a:t>
+              <a:t>Under SGAM, in all societies, SES can affect genes.</a:t>
             </a:r>
           </a:p>
           <a:p>
@@ -6828,6 +9244,16 @@
             </a:r>
           </a:p>
           <a:p>
+            <a:pPr marL="457200" indent="-457200">
+              <a:buFont typeface="Arial" panose="020B0604020202020204" pitchFamily="34" charset="0"/>
+              <a:buChar char="•"/>
+            </a:pPr>
+            <a:r>
+              <a:rPr lang="en-US"/>
+              <a:t>SGAM plus differential reproduction could induce differences in e.g. appearance between groups</a:t>
+            </a:r>
+          </a:p>
+          <a:p>
             <a:r>
               <a:rPr lang="en-US">
                 <a:solidFill>
@@ -6870,7 +9296,7 @@
             </a:pPr>
             <a:r>
               <a:rPr lang="en-US"/>
-              <a:t>But </a:t>
+              <a:t>But across generations, </a:t>
             </a:r>
             <a:r>
               <a:rPr lang="en-US" b="1">
@@ -6907,7 +9333,7 @@
               <a:rPr lang="el-GR"/>
               <a:t>.</a:t>
             </a:r>
-            <a:endParaRPr lang="en-US"/>
+            <a:endParaRPr lang="en-GB"/>
           </a:p>
         </p:txBody>
       </p:sp>
@@ -7171,7 +9597,7 @@
         </p:nvSpPr>
         <p:spPr>
           <a:xfrm>
-            <a:off x="821505" y="2766218"/>
+            <a:off x="853161" y="652765"/>
             <a:ext cx="3697077" cy="1325563"/>
           </a:xfrm>
           <a:solidFill>
@@ -7192,6 +9618,34 @@
           </a:p>
         </p:txBody>
       </p:sp>
+      <p:graphicFrame>
+        <p:nvGraphicFramePr>
+          <p:cNvPr id="2" name="Diagram 1">
+            <a:extLst>
+              <a:ext uri="{FF2B5EF4-FFF2-40B4-BE49-F238E27FC236}">
+                <a16:creationId xmlns:a16="http://schemas.microsoft.com/office/drawing/2014/main" id="{465E0EDF-30DE-BE7F-A51F-F9589F4ACE3E}"/>
+              </a:ext>
+            </a:extLst>
+          </p:cNvPr>
+          <p:cNvGraphicFramePr/>
+          <p:nvPr>
+            <p:extLst>
+              <p:ext uri="{D42A27DB-BD31-4B8C-83A1-F6EECF244321}">
+                <p14:modId xmlns:p14="http://schemas.microsoft.com/office/powerpoint/2010/main" val="2668701415"/>
+              </p:ext>
+            </p:extLst>
+          </p:nvPr>
+        </p:nvGraphicFramePr>
+        <p:xfrm>
+          <a:off x="385590" y="2522862"/>
+          <a:ext cx="4555346" cy="4075441"/>
+        </p:xfrm>
+        <a:graphic>
+          <a:graphicData uri="http://schemas.openxmlformats.org/drawingml/2006/diagram">
+            <dgm:relIds xmlns:dgm="http://schemas.openxmlformats.org/drawingml/2006/diagram" xmlns:r="http://schemas.openxmlformats.org/officeDocument/2006/relationships" r:dm="rId4" r:lo="rId5" r:qs="rId6" r:cs="rId7"/>
+          </a:graphicData>
+        </a:graphic>
+      </p:graphicFrame>
     </p:spTree>
     <p:extLst>
       <p:ext uri="{BB962C8B-B14F-4D97-AF65-F5344CB8AC3E}">

</xml_diff>

<commit_message>
Recolour one graph post-presentation for visibility
</commit_message>
<xml_diff>
--- a/BGA 2022 presentation.pptx
+++ b/BGA 2022 presentation.pptx
@@ -9250,7 +9250,7 @@
             </a:pPr>
             <a:r>
               <a:rPr lang="en-US"/>
-              <a:t>SGAM plus differential reproduction could induce differences in e.g. appearance between groups</a:t>
+              <a:t>SGAM plus differential reproduction could induce differences in e.g. appearance between groups.</a:t>
             </a:r>
           </a:p>
           <a:p>
@@ -10898,7 +10898,19 @@
           <p:nvPr/>
         </p:nvPicPr>
         <p:blipFill>
-          <a:blip r:embed="rId2"/>
+          <a:blip r:embed="rId2">
+            <a:extLst>
+              <a:ext uri="{BEBA8EAE-BF5A-486C-A8C5-ECC9F3942E4B}">
+                <a14:imgProps xmlns:a14="http://schemas.microsoft.com/office/drawing/2010/main">
+                  <a14:imgLayer r:embed="rId3">
+                    <a14:imgEffect>
+                      <a14:brightnessContrast contrast="-40000"/>
+                    </a14:imgEffect>
+                  </a14:imgLayer>
+                </a14:imgProps>
+              </a:ext>
+            </a:extLst>
+          </a:blip>
           <a:stretch>
             <a:fillRect/>
           </a:stretch>

</xml_diff>

<commit_message>
Add presentations and AER as submitted version
</commit_message>
<xml_diff>
--- a/BGA 2022 presentation.pptx
+++ b/BGA 2022 presentation.pptx
@@ -3549,7 +3549,7 @@
           </a:lstStyle>
           <a:p>
             <a:fld id="{6F94820B-6DA2-F742-93FC-1D679188A49E}" type="datetimeFigureOut">
-              <a:t>6/25/22</a:t>
+              <a:t>9/15/22</a:t>
             </a:fld>
             <a:endParaRPr lang="en-US"/>
           </a:p>
@@ -4197,7 +4197,7 @@
           <a:lstStyle/>
           <a:p>
             <a:fld id="{342F7024-5685-4041-98CF-1DBE4146085C}" type="datetimeFigureOut">
-              <a:t>6/25/22</a:t>
+              <a:t>9/15/22</a:t>
             </a:fld>
             <a:endParaRPr lang="en-US"/>
           </a:p>
@@ -4365,7 +4365,7 @@
           <a:lstStyle/>
           <a:p>
             <a:fld id="{342F7024-5685-4041-98CF-1DBE4146085C}" type="datetimeFigureOut">
-              <a:t>6/25/22</a:t>
+              <a:t>9/15/22</a:t>
             </a:fld>
             <a:endParaRPr lang="en-US"/>
           </a:p>
@@ -4543,7 +4543,7 @@
           <a:lstStyle/>
           <a:p>
             <a:fld id="{342F7024-5685-4041-98CF-1DBE4146085C}" type="datetimeFigureOut">
-              <a:t>6/25/22</a:t>
+              <a:t>9/15/22</a:t>
             </a:fld>
             <a:endParaRPr lang="en-US"/>
           </a:p>
@@ -4716,7 +4716,7 @@
           <a:lstStyle/>
           <a:p>
             <a:fld id="{342F7024-5685-4041-98CF-1DBE4146085C}" type="datetimeFigureOut">
-              <a:t>6/25/22</a:t>
+              <a:t>9/15/22</a:t>
             </a:fld>
             <a:endParaRPr lang="en-US"/>
           </a:p>
@@ -4960,7 +4960,7 @@
           <a:lstStyle/>
           <a:p>
             <a:fld id="{342F7024-5685-4041-98CF-1DBE4146085C}" type="datetimeFigureOut">
-              <a:t>6/25/22</a:t>
+              <a:t>9/15/22</a:t>
             </a:fld>
             <a:endParaRPr lang="en-US"/>
           </a:p>
@@ -5190,7 +5190,7 @@
           <a:lstStyle/>
           <a:p>
             <a:fld id="{342F7024-5685-4041-98CF-1DBE4146085C}" type="datetimeFigureOut">
-              <a:t>6/25/22</a:t>
+              <a:t>9/15/22</a:t>
             </a:fld>
             <a:endParaRPr lang="en-US"/>
           </a:p>
@@ -5555,7 +5555,7 @@
           <a:lstStyle/>
           <a:p>
             <a:fld id="{342F7024-5685-4041-98CF-1DBE4146085C}" type="datetimeFigureOut">
-              <a:t>6/25/22</a:t>
+              <a:t>9/15/22</a:t>
             </a:fld>
             <a:endParaRPr lang="en-US"/>
           </a:p>
@@ -5671,7 +5671,7 @@
           <a:lstStyle/>
           <a:p>
             <a:fld id="{342F7024-5685-4041-98CF-1DBE4146085C}" type="datetimeFigureOut">
-              <a:t>6/25/22</a:t>
+              <a:t>9/15/22</a:t>
             </a:fld>
             <a:endParaRPr lang="en-US"/>
           </a:p>
@@ -5764,7 +5764,7 @@
           <a:lstStyle/>
           <a:p>
             <a:fld id="{342F7024-5685-4041-98CF-1DBE4146085C}" type="datetimeFigureOut">
-              <a:t>6/25/22</a:t>
+              <a:t>9/15/22</a:t>
             </a:fld>
             <a:endParaRPr lang="en-US"/>
           </a:p>
@@ -6039,7 +6039,7 @@
           <a:lstStyle/>
           <a:p>
             <a:fld id="{342F7024-5685-4041-98CF-1DBE4146085C}" type="datetimeFigureOut">
-              <a:t>6/25/22</a:t>
+              <a:t>9/15/22</a:t>
             </a:fld>
             <a:endParaRPr lang="en-US"/>
           </a:p>
@@ -6294,7 +6294,7 @@
           <a:lstStyle/>
           <a:p>
             <a:fld id="{342F7024-5685-4041-98CF-1DBE4146085C}" type="datetimeFigureOut">
-              <a:t>6/25/22</a:t>
+              <a:t>9/15/22</a:t>
             </a:fld>
             <a:endParaRPr lang="en-US"/>
           </a:p>
@@ -6508,7 +6508,7 @@
           </a:lstStyle>
           <a:p>
             <a:fld id="{342F7024-5685-4041-98CF-1DBE4146085C}" type="datetimeFigureOut">
-              <a:t>6/25/22</a:t>
+              <a:t>9/15/22</a:t>
             </a:fld>
             <a:endParaRPr lang="en-US"/>
           </a:p>

</xml_diff>